<commit_message>
Draft docker container and update archi
</commit_message>
<xml_diff>
--- a/report/architecture.pptx
+++ b/report/architecture.pptx
@@ -39,7 +39,7 @@
         <a:uFillTx/>
       </a:defRPr>
     </a:defPPr>
-    <a:lvl1pPr marL="0" marR="0" indent="0" algn="ctr" defTabSz="2438338" rtl="0" fontAlgn="auto" latinLnBrk="0" hangingPunct="0">
+    <a:lvl1pPr marL="0" marR="0" indent="0" algn="ctr" defTabSz="2438337" rtl="0" fontAlgn="auto" latinLnBrk="0" hangingPunct="0">
       <a:lnSpc>
         <a:spcPct val="100000"/>
       </a:lnSpc>
@@ -63,13 +63,13 @@
         </a:solidFill>
         <a:effectLst/>
         <a:uFillTx/>
-        <a:latin typeface="+mn-lt"/>
-        <a:ea typeface="+mn-ea"/>
-        <a:cs typeface="+mn-cs"/>
+        <a:latin typeface="+mj-lt"/>
+        <a:ea typeface="+mj-ea"/>
+        <a:cs typeface="+mj-cs"/>
         <a:sym typeface="Helvetica Neue"/>
       </a:defRPr>
     </a:lvl1pPr>
-    <a:lvl2pPr marL="0" marR="0" indent="457200" algn="ctr" defTabSz="2438338" rtl="0" fontAlgn="auto" latinLnBrk="0" hangingPunct="0">
+    <a:lvl2pPr marL="0" marR="0" indent="0" algn="ctr" defTabSz="2438337" rtl="0" fontAlgn="auto" latinLnBrk="0" hangingPunct="0">
       <a:lnSpc>
         <a:spcPct val="100000"/>
       </a:lnSpc>
@@ -93,13 +93,13 @@
         </a:solidFill>
         <a:effectLst/>
         <a:uFillTx/>
-        <a:latin typeface="+mn-lt"/>
-        <a:ea typeface="+mn-ea"/>
-        <a:cs typeface="+mn-cs"/>
+        <a:latin typeface="+mj-lt"/>
+        <a:ea typeface="+mj-ea"/>
+        <a:cs typeface="+mj-cs"/>
         <a:sym typeface="Helvetica Neue"/>
       </a:defRPr>
     </a:lvl2pPr>
-    <a:lvl3pPr marL="0" marR="0" indent="914400" algn="ctr" defTabSz="2438338" rtl="0" fontAlgn="auto" latinLnBrk="0" hangingPunct="0">
+    <a:lvl3pPr marL="0" marR="0" indent="0" algn="ctr" defTabSz="2438337" rtl="0" fontAlgn="auto" latinLnBrk="0" hangingPunct="0">
       <a:lnSpc>
         <a:spcPct val="100000"/>
       </a:lnSpc>
@@ -123,13 +123,13 @@
         </a:solidFill>
         <a:effectLst/>
         <a:uFillTx/>
-        <a:latin typeface="+mn-lt"/>
-        <a:ea typeface="+mn-ea"/>
-        <a:cs typeface="+mn-cs"/>
+        <a:latin typeface="+mj-lt"/>
+        <a:ea typeface="+mj-ea"/>
+        <a:cs typeface="+mj-cs"/>
         <a:sym typeface="Helvetica Neue"/>
       </a:defRPr>
     </a:lvl3pPr>
-    <a:lvl4pPr marL="0" marR="0" indent="1371600" algn="ctr" defTabSz="2438338" rtl="0" fontAlgn="auto" latinLnBrk="0" hangingPunct="0">
+    <a:lvl4pPr marL="0" marR="0" indent="0" algn="ctr" defTabSz="2438337" rtl="0" fontAlgn="auto" latinLnBrk="0" hangingPunct="0">
       <a:lnSpc>
         <a:spcPct val="100000"/>
       </a:lnSpc>
@@ -153,13 +153,13 @@
         </a:solidFill>
         <a:effectLst/>
         <a:uFillTx/>
-        <a:latin typeface="+mn-lt"/>
-        <a:ea typeface="+mn-ea"/>
-        <a:cs typeface="+mn-cs"/>
+        <a:latin typeface="+mj-lt"/>
+        <a:ea typeface="+mj-ea"/>
+        <a:cs typeface="+mj-cs"/>
         <a:sym typeface="Helvetica Neue"/>
       </a:defRPr>
     </a:lvl4pPr>
-    <a:lvl5pPr marL="0" marR="0" indent="1828800" algn="ctr" defTabSz="2438338" rtl="0" fontAlgn="auto" latinLnBrk="0" hangingPunct="0">
+    <a:lvl5pPr marL="0" marR="0" indent="0" algn="ctr" defTabSz="2438337" rtl="0" fontAlgn="auto" latinLnBrk="0" hangingPunct="0">
       <a:lnSpc>
         <a:spcPct val="100000"/>
       </a:lnSpc>
@@ -183,13 +183,13 @@
         </a:solidFill>
         <a:effectLst/>
         <a:uFillTx/>
-        <a:latin typeface="+mn-lt"/>
-        <a:ea typeface="+mn-ea"/>
-        <a:cs typeface="+mn-cs"/>
+        <a:latin typeface="+mj-lt"/>
+        <a:ea typeface="+mj-ea"/>
+        <a:cs typeface="+mj-cs"/>
         <a:sym typeface="Helvetica Neue"/>
       </a:defRPr>
     </a:lvl5pPr>
-    <a:lvl6pPr marL="0" marR="0" indent="2286000" algn="ctr" defTabSz="2438338" rtl="0" fontAlgn="auto" latinLnBrk="0" hangingPunct="0">
+    <a:lvl6pPr marL="0" marR="0" indent="0" algn="ctr" defTabSz="2438337" rtl="0" fontAlgn="auto" latinLnBrk="0" hangingPunct="0">
       <a:lnSpc>
         <a:spcPct val="100000"/>
       </a:lnSpc>
@@ -213,13 +213,13 @@
         </a:solidFill>
         <a:effectLst/>
         <a:uFillTx/>
-        <a:latin typeface="+mn-lt"/>
-        <a:ea typeface="+mn-ea"/>
-        <a:cs typeface="+mn-cs"/>
+        <a:latin typeface="+mj-lt"/>
+        <a:ea typeface="+mj-ea"/>
+        <a:cs typeface="+mj-cs"/>
         <a:sym typeface="Helvetica Neue"/>
       </a:defRPr>
     </a:lvl6pPr>
-    <a:lvl7pPr marL="0" marR="0" indent="2743200" algn="ctr" defTabSz="2438338" rtl="0" fontAlgn="auto" latinLnBrk="0" hangingPunct="0">
+    <a:lvl7pPr marL="0" marR="0" indent="0" algn="ctr" defTabSz="2438337" rtl="0" fontAlgn="auto" latinLnBrk="0" hangingPunct="0">
       <a:lnSpc>
         <a:spcPct val="100000"/>
       </a:lnSpc>
@@ -243,13 +243,13 @@
         </a:solidFill>
         <a:effectLst/>
         <a:uFillTx/>
-        <a:latin typeface="+mn-lt"/>
-        <a:ea typeface="+mn-ea"/>
-        <a:cs typeface="+mn-cs"/>
+        <a:latin typeface="+mj-lt"/>
+        <a:ea typeface="+mj-ea"/>
+        <a:cs typeface="+mj-cs"/>
         <a:sym typeface="Helvetica Neue"/>
       </a:defRPr>
     </a:lvl7pPr>
-    <a:lvl8pPr marL="0" marR="0" indent="3200400" algn="ctr" defTabSz="2438338" rtl="0" fontAlgn="auto" latinLnBrk="0" hangingPunct="0">
+    <a:lvl8pPr marL="0" marR="0" indent="0" algn="ctr" defTabSz="2438337" rtl="0" fontAlgn="auto" latinLnBrk="0" hangingPunct="0">
       <a:lnSpc>
         <a:spcPct val="100000"/>
       </a:lnSpc>
@@ -273,13 +273,13 @@
         </a:solidFill>
         <a:effectLst/>
         <a:uFillTx/>
-        <a:latin typeface="+mn-lt"/>
-        <a:ea typeface="+mn-ea"/>
-        <a:cs typeface="+mn-cs"/>
+        <a:latin typeface="+mj-lt"/>
+        <a:ea typeface="+mj-ea"/>
+        <a:cs typeface="+mj-cs"/>
         <a:sym typeface="Helvetica Neue"/>
       </a:defRPr>
     </a:lvl8pPr>
-    <a:lvl9pPr marL="0" marR="0" indent="3657600" algn="ctr" defTabSz="2438338" rtl="0" fontAlgn="auto" latinLnBrk="0" hangingPunct="0">
+    <a:lvl9pPr marL="0" marR="0" indent="0" algn="ctr" defTabSz="2438337" rtl="0" fontAlgn="auto" latinLnBrk="0" hangingPunct="0">
       <a:lnSpc>
         <a:spcPct val="100000"/>
       </a:lnSpc>
@@ -303,9 +303,9 @@
         </a:solidFill>
         <a:effectLst/>
         <a:uFillTx/>
-        <a:latin typeface="+mn-lt"/>
-        <a:ea typeface="+mn-ea"/>
-        <a:cs typeface="+mn-cs"/>
+        <a:latin typeface="+mj-lt"/>
+        <a:ea typeface="+mj-ea"/>
+        <a:cs typeface="+mj-cs"/>
         <a:sym typeface="Helvetica Neue"/>
       </a:defRPr>
     </a:lvl9pPr>
@@ -393,9 +393,9 @@
         <a:spcPct val="117999"/>
       </a:lnSpc>
       <a:defRPr sz="2200">
-        <a:latin typeface="+mn-lt"/>
-        <a:ea typeface="+mn-ea"/>
-        <a:cs typeface="+mn-cs"/>
+        <a:latin typeface="+mj-lt"/>
+        <a:ea typeface="+mj-ea"/>
+        <a:cs typeface="+mj-cs"/>
         <a:sym typeface="Helvetica Neue"/>
       </a:defRPr>
     </a:lvl1pPr>
@@ -404,9 +404,9 @@
         <a:spcPct val="117999"/>
       </a:lnSpc>
       <a:defRPr sz="2200">
-        <a:latin typeface="+mn-lt"/>
-        <a:ea typeface="+mn-ea"/>
-        <a:cs typeface="+mn-cs"/>
+        <a:latin typeface="+mj-lt"/>
+        <a:ea typeface="+mj-ea"/>
+        <a:cs typeface="+mj-cs"/>
         <a:sym typeface="Helvetica Neue"/>
       </a:defRPr>
     </a:lvl2pPr>
@@ -415,9 +415,9 @@
         <a:spcPct val="117999"/>
       </a:lnSpc>
       <a:defRPr sz="2200">
-        <a:latin typeface="+mn-lt"/>
-        <a:ea typeface="+mn-ea"/>
-        <a:cs typeface="+mn-cs"/>
+        <a:latin typeface="+mj-lt"/>
+        <a:ea typeface="+mj-ea"/>
+        <a:cs typeface="+mj-cs"/>
         <a:sym typeface="Helvetica Neue"/>
       </a:defRPr>
     </a:lvl3pPr>
@@ -426,9 +426,9 @@
         <a:spcPct val="117999"/>
       </a:lnSpc>
       <a:defRPr sz="2200">
-        <a:latin typeface="+mn-lt"/>
-        <a:ea typeface="+mn-ea"/>
-        <a:cs typeface="+mn-cs"/>
+        <a:latin typeface="+mj-lt"/>
+        <a:ea typeface="+mj-ea"/>
+        <a:cs typeface="+mj-cs"/>
         <a:sym typeface="Helvetica Neue"/>
       </a:defRPr>
     </a:lvl4pPr>
@@ -437,9 +437,9 @@
         <a:spcPct val="117999"/>
       </a:lnSpc>
       <a:defRPr sz="2200">
-        <a:latin typeface="+mn-lt"/>
-        <a:ea typeface="+mn-ea"/>
-        <a:cs typeface="+mn-cs"/>
+        <a:latin typeface="+mj-lt"/>
+        <a:ea typeface="+mj-ea"/>
+        <a:cs typeface="+mj-cs"/>
         <a:sym typeface="Helvetica Neue"/>
       </a:defRPr>
     </a:lvl5pPr>
@@ -448,9 +448,9 @@
         <a:spcPct val="117999"/>
       </a:lnSpc>
       <a:defRPr sz="2200">
-        <a:latin typeface="+mn-lt"/>
-        <a:ea typeface="+mn-ea"/>
-        <a:cs typeface="+mn-cs"/>
+        <a:latin typeface="+mj-lt"/>
+        <a:ea typeface="+mj-ea"/>
+        <a:cs typeface="+mj-cs"/>
         <a:sym typeface="Helvetica Neue"/>
       </a:defRPr>
     </a:lvl6pPr>
@@ -459,9 +459,9 @@
         <a:spcPct val="117999"/>
       </a:lnSpc>
       <a:defRPr sz="2200">
-        <a:latin typeface="+mn-lt"/>
-        <a:ea typeface="+mn-ea"/>
-        <a:cs typeface="+mn-cs"/>
+        <a:latin typeface="+mj-lt"/>
+        <a:ea typeface="+mj-ea"/>
+        <a:cs typeface="+mj-cs"/>
         <a:sym typeface="Helvetica Neue"/>
       </a:defRPr>
     </a:lvl7pPr>
@@ -470,9 +470,9 @@
         <a:spcPct val="117999"/>
       </a:lnSpc>
       <a:defRPr sz="2200">
-        <a:latin typeface="+mn-lt"/>
-        <a:ea typeface="+mn-ea"/>
-        <a:cs typeface="+mn-cs"/>
+        <a:latin typeface="+mj-lt"/>
+        <a:ea typeface="+mj-ea"/>
+        <a:cs typeface="+mj-cs"/>
         <a:sym typeface="Helvetica Neue"/>
       </a:defRPr>
     </a:lvl8pPr>
@@ -481,9 +481,9 @@
         <a:spcPct val="117999"/>
       </a:lnSpc>
       <a:defRPr sz="2200">
-        <a:latin typeface="+mn-lt"/>
-        <a:ea typeface="+mn-ea"/>
-        <a:cs typeface="+mn-cs"/>
+        <a:latin typeface="+mj-lt"/>
+        <a:ea typeface="+mj-ea"/>
+        <a:cs typeface="+mj-cs"/>
         <a:sym typeface="Helvetica Neue"/>
       </a:defRPr>
     </a:lvl9pPr>
@@ -492,7 +492,7 @@
 </file>
 
 <file path=ppt/slideLayouts/slideLayout1.xml><?xml version="1.0" encoding="utf-8"?>
-<p:sldLayout xmlns:a="http://schemas.openxmlformats.org/drawingml/2006/main" xmlns:r="http://schemas.openxmlformats.org/officeDocument/2006/relationships" xmlns:p="http://schemas.openxmlformats.org/presentationml/2006/main" xmlns:m="http://schemas.openxmlformats.org/officeDocument/2006/math" xmlns:a14="http://schemas.microsoft.com/office/drawing/2010/main" type="title" showMasterSp="1" showMasterPhAnim="1">
+<p:sldLayout xmlns:a="http://schemas.openxmlformats.org/drawingml/2006/main" xmlns:r="http://schemas.openxmlformats.org/officeDocument/2006/relationships" xmlns:p="http://schemas.openxmlformats.org/presentationml/2006/main" xmlns:m="http://schemas.openxmlformats.org/officeDocument/2006/math" xmlns:a14="http://schemas.microsoft.com/office/drawing/2010/main" type="tx" showMasterSp="1" showMasterPhAnim="1">
   <p:cSld name="Title">
     <p:spTree>
       <p:nvGrpSpPr>
@@ -510,23 +510,23 @@
       </p:grpSpPr>
       <p:sp>
         <p:nvSpPr>
-          <p:cNvPr id="11" name="Author and Date"/>
+          <p:cNvPr id="11" name="Body Level One…"/>
           <p:cNvSpPr txBox="1"/>
           <p:nvPr>
-            <p:ph type="body" sz="quarter" idx="21" hasCustomPrompt="1"/>
+            <p:ph type="body" sz="quarter" idx="1" hasCustomPrompt="1"/>
           </p:nvPr>
         </p:nvSpPr>
         <p:spPr>
           <a:xfrm>
             <a:off x="1201340" y="11859862"/>
-            <a:ext cx="21971003" cy="636979"/>
+            <a:ext cx="21971004" cy="636980"/>
           </a:xfrm>
           <a:prstGeom prst="rect">
             <a:avLst/>
           </a:prstGeom>
         </p:spPr>
         <p:txBody>
-          <a:bodyPr lIns="45719" tIns="45719" rIns="45719" bIns="45719"/>
+          <a:bodyPr lIns="45718" tIns="45718" rIns="45718" bIns="45718" numCol="1" spcCol="38100"/>
           <a:lstStyle>
             <a:lvl1pPr marL="0" indent="0" defTabSz="825500">
               <a:lnSpc>
@@ -539,11 +539,71 @@
               <a:buNone/>
               <a:defRPr b="1" sz="3600"/>
             </a:lvl1pPr>
+            <a:lvl2pPr marL="1066800" indent="-457200" defTabSz="825500">
+              <a:lnSpc>
+                <a:spcPct val="100000"/>
+              </a:lnSpc>
+              <a:spcBef>
+                <a:spcPts val="0"/>
+              </a:spcBef>
+              <a:defRPr b="1" sz="3600"/>
+            </a:lvl2pPr>
+            <a:lvl3pPr marL="1676400" indent="-457200" defTabSz="825500">
+              <a:lnSpc>
+                <a:spcPct val="100000"/>
+              </a:lnSpc>
+              <a:spcBef>
+                <a:spcPts val="0"/>
+              </a:spcBef>
+              <a:defRPr b="1" sz="3600"/>
+            </a:lvl3pPr>
+            <a:lvl4pPr marL="2286000" indent="-457200" defTabSz="825500">
+              <a:lnSpc>
+                <a:spcPct val="100000"/>
+              </a:lnSpc>
+              <a:spcBef>
+                <a:spcPts val="0"/>
+              </a:spcBef>
+              <a:defRPr b="1" sz="3600"/>
+            </a:lvl4pPr>
+            <a:lvl5pPr marL="2895600" indent="-457200" defTabSz="825500">
+              <a:lnSpc>
+                <a:spcPct val="100000"/>
+              </a:lnSpc>
+              <a:spcBef>
+                <a:spcPts val="0"/>
+              </a:spcBef>
+              <a:defRPr b="1" sz="3600"/>
+            </a:lvl5pPr>
           </a:lstStyle>
           <a:p>
             <a:pPr/>
             <a:r>
               <a:t>Author and Date</a:t>
+            </a:r>
+          </a:p>
+          <a:p>
+            <a:pPr lvl="1"/>
+            <a:r>
+              <a:t/>
+            </a:r>
+          </a:p>
+          <a:p>
+            <a:pPr lvl="2"/>
+            <a:r>
+              <a:t/>
+            </a:r>
+          </a:p>
+          <a:p>
+            <a:pPr lvl="3"/>
+            <a:r>
+              <a:t/>
+            </a:r>
+          </a:p>
+          <a:p>
+            <a:pPr lvl="4"/>
+            <a:r>
+              <a:t/>
             </a:r>
           </a:p>
         </p:txBody>
@@ -559,7 +619,7 @@
         <p:spPr>
           <a:xfrm>
             <a:off x="1206496" y="2574991"/>
-            <a:ext cx="21971004" cy="4648201"/>
+            <a:ext cx="21971005" cy="4648202"/>
           </a:xfrm>
           <a:prstGeom prst="rect">
             <a:avLst/>
@@ -585,20 +645,20 @@
           <p:cNvPr id="13" name="Body Level One…"/>
           <p:cNvSpPr txBox="1"/>
           <p:nvPr>
-            <p:ph type="body" sz="quarter" idx="1" hasCustomPrompt="1"/>
+            <p:ph type="body" sz="quarter" idx="21" hasCustomPrompt="1"/>
           </p:nvPr>
         </p:nvSpPr>
         <p:spPr>
           <a:xfrm>
             <a:off x="1201342" y="7223190"/>
-            <a:ext cx="21971001" cy="1905001"/>
+            <a:ext cx="21971002" cy="1905002"/>
           </a:xfrm>
           <a:prstGeom prst="rect">
             <a:avLst/>
           </a:prstGeom>
         </p:spPr>
         <p:txBody>
-          <a:bodyPr/>
+          <a:bodyPr numCol="1" spcCol="38100"/>
           <a:lstStyle>
             <a:lvl1pPr marL="0" indent="0" defTabSz="825500">
               <a:lnSpc>
@@ -611,79 +671,11 @@
               <a:buNone/>
               <a:defRPr b="1" sz="5500"/>
             </a:lvl1pPr>
-            <a:lvl2pPr marL="0" indent="457200" defTabSz="825500">
-              <a:lnSpc>
-                <a:spcPct val="100000"/>
-              </a:lnSpc>
-              <a:spcBef>
-                <a:spcPts val="0"/>
-              </a:spcBef>
-              <a:buSzTx/>
-              <a:buNone/>
-              <a:defRPr b="1" sz="5500"/>
-            </a:lvl2pPr>
-            <a:lvl3pPr marL="0" indent="914400" defTabSz="825500">
-              <a:lnSpc>
-                <a:spcPct val="100000"/>
-              </a:lnSpc>
-              <a:spcBef>
-                <a:spcPts val="0"/>
-              </a:spcBef>
-              <a:buSzTx/>
-              <a:buNone/>
-              <a:defRPr b="1" sz="5500"/>
-            </a:lvl3pPr>
-            <a:lvl4pPr marL="0" indent="1371600" defTabSz="825500">
-              <a:lnSpc>
-                <a:spcPct val="100000"/>
-              </a:lnSpc>
-              <a:spcBef>
-                <a:spcPts val="0"/>
-              </a:spcBef>
-              <a:buSzTx/>
-              <a:buNone/>
-              <a:defRPr b="1" sz="5500"/>
-            </a:lvl4pPr>
-            <a:lvl5pPr marL="0" indent="1828800" defTabSz="825500">
-              <a:lnSpc>
-                <a:spcPct val="100000"/>
-              </a:lnSpc>
-              <a:spcBef>
-                <a:spcPts val="0"/>
-              </a:spcBef>
-              <a:buSzTx/>
-              <a:buNone/>
-              <a:defRPr b="1" sz="5500"/>
-            </a:lvl5pPr>
           </a:lstStyle>
           <a:p>
             <a:pPr/>
             <a:r>
               <a:t>Presentation Subtitle</a:t>
-            </a:r>
-          </a:p>
-          <a:p>
-            <a:pPr lvl="1"/>
-            <a:r>
-              <a:t/>
-            </a:r>
-          </a:p>
-          <a:p>
-            <a:pPr lvl="2"/>
-            <a:r>
-              <a:t/>
-            </a:r>
-          </a:p>
-          <a:p>
-            <a:pPr lvl="3"/>
-            <a:r>
-              <a:t/>
-            </a:r>
-          </a:p>
-          <a:p>
-            <a:pPr lvl="4"/>
-            <a:r>
-              <a:t/>
             </a:r>
           </a:p>
         </p:txBody>
@@ -754,7 +746,7 @@
           </a:prstGeom>
         </p:spPr>
         <p:txBody>
-          <a:bodyPr anchor="ctr"/>
+          <a:bodyPr numCol="1" spcCol="38100" anchor="ctr"/>
           <a:lstStyle>
             <a:lvl1pPr marL="0" indent="0" algn="ctr">
               <a:lnSpc>
@@ -772,7 +764,7 @@
                 <a:sym typeface="Helvetica Neue Medium"/>
               </a:defRPr>
             </a:lvl1pPr>
-            <a:lvl2pPr marL="0" indent="457200" algn="ctr">
+            <a:lvl2pPr marL="0" indent="0" algn="ctr">
               <a:lnSpc>
                 <a:spcPct val="80000"/>
               </a:lnSpc>
@@ -788,7 +780,7 @@
                 <a:sym typeface="Helvetica Neue Medium"/>
               </a:defRPr>
             </a:lvl2pPr>
-            <a:lvl3pPr marL="0" indent="914400" algn="ctr">
+            <a:lvl3pPr marL="0" indent="0" algn="ctr">
               <a:lnSpc>
                 <a:spcPct val="80000"/>
               </a:lnSpc>
@@ -804,7 +796,7 @@
                 <a:sym typeface="Helvetica Neue Medium"/>
               </a:defRPr>
             </a:lvl3pPr>
-            <a:lvl4pPr marL="0" indent="1371600" algn="ctr">
+            <a:lvl4pPr marL="0" indent="0" algn="ctr">
               <a:lnSpc>
                 <a:spcPct val="80000"/>
               </a:lnSpc>
@@ -820,7 +812,7 @@
                 <a:sym typeface="Helvetica Neue Medium"/>
               </a:defRPr>
             </a:lvl4pPr>
-            <a:lvl5pPr marL="0" indent="1828800" algn="ctr">
+            <a:lvl5pPr marL="0" indent="0" algn="ctr">
               <a:lnSpc>
                 <a:spcPct val="80000"/>
               </a:lnSpc>
@@ -927,15 +919,15 @@
         </p:nvSpPr>
         <p:spPr>
           <a:xfrm>
-            <a:off x="1206500" y="1075927"/>
-            <a:ext cx="21971000" cy="7241584"/>
+            <a:off x="1206500" y="1075926"/>
+            <a:ext cx="21971000" cy="7241586"/>
           </a:xfrm>
           <a:prstGeom prst="rect">
             <a:avLst/>
           </a:prstGeom>
         </p:spPr>
         <p:txBody>
-          <a:bodyPr anchor="b"/>
+          <a:bodyPr numCol="1" spcCol="38100" anchor="b"/>
           <a:lstStyle>
             <a:lvl1pPr marL="0" indent="0" algn="ctr">
               <a:lnSpc>
@@ -948,7 +940,7 @@
               <a:buNone/>
               <a:defRPr b="1" spc="-250" sz="25000"/>
             </a:lvl1pPr>
-            <a:lvl2pPr marL="0" indent="457200" algn="ctr">
+            <a:lvl2pPr marL="0" indent="0" algn="ctr">
               <a:lnSpc>
                 <a:spcPct val="80000"/>
               </a:lnSpc>
@@ -959,7 +951,7 @@
               <a:buNone/>
               <a:defRPr b="1" spc="-250" sz="25000"/>
             </a:lvl2pPr>
-            <a:lvl3pPr marL="0" indent="914400" algn="ctr">
+            <a:lvl3pPr marL="0" indent="0" algn="ctr">
               <a:lnSpc>
                 <a:spcPct val="80000"/>
               </a:lnSpc>
@@ -970,7 +962,7 @@
               <a:buNone/>
               <a:defRPr b="1" spc="-250" sz="25000"/>
             </a:lvl3pPr>
-            <a:lvl4pPr marL="0" indent="1371600" algn="ctr">
+            <a:lvl4pPr marL="0" indent="0" algn="ctr">
               <a:lnSpc>
                 <a:spcPct val="80000"/>
               </a:lnSpc>
@@ -981,7 +973,7 @@
               <a:buNone/>
               <a:defRPr b="1" spc="-250" sz="25000"/>
             </a:lvl4pPr>
-            <a:lvl5pPr marL="0" indent="1828800" algn="ctr">
+            <a:lvl5pPr marL="0" indent="0" algn="ctr">
               <a:lnSpc>
                 <a:spcPct val="80000"/>
               </a:lnSpc>
@@ -1043,7 +1035,7 @@
           </a:prstGeom>
         </p:spPr>
         <p:txBody>
-          <a:bodyPr lIns="45719" tIns="45719" rIns="45719" bIns="45719"/>
+          <a:bodyPr lIns="45718" tIns="45718" rIns="45718" bIns="45718" numCol="1" spcCol="38100"/>
           <a:lstStyle>
             <a:lvl1pPr marL="0" indent="0" algn="ctr" defTabSz="825500">
               <a:lnSpc>
@@ -1115,23 +1107,23 @@
       </p:grpSpPr>
       <p:sp>
         <p:nvSpPr>
-          <p:cNvPr id="115" name="Attribution"/>
+          <p:cNvPr id="115" name="Body Level One…"/>
           <p:cNvSpPr txBox="1"/>
           <p:nvPr>
-            <p:ph type="body" sz="quarter" idx="21" hasCustomPrompt="1"/>
+            <p:ph type="body" sz="quarter" idx="1" hasCustomPrompt="1"/>
           </p:nvPr>
         </p:nvSpPr>
         <p:spPr>
           <a:xfrm>
-            <a:off x="2430025" y="10675453"/>
-            <a:ext cx="20200052" cy="636979"/>
+            <a:off x="2430024" y="10675453"/>
+            <a:ext cx="20200054" cy="636980"/>
           </a:xfrm>
           <a:prstGeom prst="rect">
             <a:avLst/>
           </a:prstGeom>
         </p:spPr>
         <p:txBody>
-          <a:bodyPr lIns="45719" tIns="45719" rIns="45719" bIns="45719"/>
+          <a:bodyPr lIns="45718" tIns="45718" rIns="45718" bIns="45718" numCol="1" spcCol="38100"/>
           <a:lstStyle>
             <a:lvl1pPr marL="0" indent="0" defTabSz="825500">
               <a:lnSpc>
@@ -1144,11 +1136,71 @@
               <a:buNone/>
               <a:defRPr b="1" sz="3600"/>
             </a:lvl1pPr>
+            <a:lvl2pPr marL="1066800" indent="-457200" defTabSz="825500">
+              <a:lnSpc>
+                <a:spcPct val="100000"/>
+              </a:lnSpc>
+              <a:spcBef>
+                <a:spcPts val="0"/>
+              </a:spcBef>
+              <a:defRPr b="1" sz="3600"/>
+            </a:lvl2pPr>
+            <a:lvl3pPr marL="1676400" indent="-457200" defTabSz="825500">
+              <a:lnSpc>
+                <a:spcPct val="100000"/>
+              </a:lnSpc>
+              <a:spcBef>
+                <a:spcPts val="0"/>
+              </a:spcBef>
+              <a:defRPr b="1" sz="3600"/>
+            </a:lvl3pPr>
+            <a:lvl4pPr marL="2286000" indent="-457200" defTabSz="825500">
+              <a:lnSpc>
+                <a:spcPct val="100000"/>
+              </a:lnSpc>
+              <a:spcBef>
+                <a:spcPts val="0"/>
+              </a:spcBef>
+              <a:defRPr b="1" sz="3600"/>
+            </a:lvl4pPr>
+            <a:lvl5pPr marL="2895600" indent="-457200" defTabSz="825500">
+              <a:lnSpc>
+                <a:spcPct val="100000"/>
+              </a:lnSpc>
+              <a:spcBef>
+                <a:spcPts val="0"/>
+              </a:spcBef>
+              <a:defRPr b="1" sz="3600"/>
+            </a:lvl5pPr>
           </a:lstStyle>
           <a:p>
             <a:pPr/>
             <a:r>
               <a:t>Attribution</a:t>
+            </a:r>
+          </a:p>
+          <a:p>
+            <a:pPr lvl="1"/>
+            <a:r>
+              <a:t/>
+            </a:r>
+          </a:p>
+          <a:p>
+            <a:pPr lvl="2"/>
+            <a:r>
+              <a:t/>
+            </a:r>
+          </a:p>
+          <a:p>
+            <a:pPr lvl="3"/>
+            <a:r>
+              <a:t/>
+            </a:r>
+          </a:p>
+          <a:p>
+            <a:pPr lvl="4"/>
+            <a:r>
+              <a:t/>
             </a:r>
           </a:p>
         </p:txBody>
@@ -1158,115 +1210,39 @@
           <p:cNvPr id="116" name="Body Level One…"/>
           <p:cNvSpPr txBox="1"/>
           <p:nvPr>
-            <p:ph type="body" sz="half" idx="1" hasCustomPrompt="1"/>
+            <p:ph type="body" sz="half" idx="21" hasCustomPrompt="1"/>
           </p:nvPr>
         </p:nvSpPr>
         <p:spPr>
           <a:xfrm>
             <a:off x="1753923" y="4939860"/>
-            <a:ext cx="20876154" cy="3836280"/>
+            <a:ext cx="20876154" cy="3836281"/>
           </a:xfrm>
           <a:prstGeom prst="rect">
             <a:avLst/>
           </a:prstGeom>
         </p:spPr>
         <p:txBody>
-          <a:bodyPr/>
+          <a:bodyPr numCol="1" spcCol="38100"/>
           <a:lstStyle>
-            <a:lvl1pPr marL="638923" indent="-469900">
+            <a:lvl1pPr marL="469900" indent="-300876">
               <a:spcBef>
                 <a:spcPts val="0"/>
               </a:spcBef>
               <a:buSzTx/>
               <a:buNone/>
-              <a:defRPr spc="-170" sz="8500">
+              <a:defRPr spc="-200" sz="8500">
                 <a:latin typeface="Helvetica Neue Medium"/>
                 <a:ea typeface="Helvetica Neue Medium"/>
                 <a:cs typeface="Helvetica Neue Medium"/>
                 <a:sym typeface="Helvetica Neue Medium"/>
               </a:defRPr>
             </a:lvl1pPr>
-            <a:lvl2pPr marL="638923" indent="-12700">
-              <a:spcBef>
-                <a:spcPts val="0"/>
-              </a:spcBef>
-              <a:buSzTx/>
-              <a:buNone/>
-              <a:defRPr spc="-170" sz="8500">
-                <a:latin typeface="Helvetica Neue Medium"/>
-                <a:ea typeface="Helvetica Neue Medium"/>
-                <a:cs typeface="Helvetica Neue Medium"/>
-                <a:sym typeface="Helvetica Neue Medium"/>
-              </a:defRPr>
-            </a:lvl2pPr>
-            <a:lvl3pPr marL="638923" indent="444500">
-              <a:spcBef>
-                <a:spcPts val="0"/>
-              </a:spcBef>
-              <a:buSzTx/>
-              <a:buNone/>
-              <a:defRPr spc="-170" sz="8500">
-                <a:latin typeface="Helvetica Neue Medium"/>
-                <a:ea typeface="Helvetica Neue Medium"/>
-                <a:cs typeface="Helvetica Neue Medium"/>
-                <a:sym typeface="Helvetica Neue Medium"/>
-              </a:defRPr>
-            </a:lvl3pPr>
-            <a:lvl4pPr marL="638923" indent="901700">
-              <a:spcBef>
-                <a:spcPts val="0"/>
-              </a:spcBef>
-              <a:buSzTx/>
-              <a:buNone/>
-              <a:defRPr spc="-170" sz="8500">
-                <a:latin typeface="Helvetica Neue Medium"/>
-                <a:ea typeface="Helvetica Neue Medium"/>
-                <a:cs typeface="Helvetica Neue Medium"/>
-                <a:sym typeface="Helvetica Neue Medium"/>
-              </a:defRPr>
-            </a:lvl4pPr>
-            <a:lvl5pPr marL="638923" indent="1358900">
-              <a:spcBef>
-                <a:spcPts val="0"/>
-              </a:spcBef>
-              <a:buSzTx/>
-              <a:buNone/>
-              <a:defRPr spc="-170" sz="8500">
-                <a:latin typeface="Helvetica Neue Medium"/>
-                <a:ea typeface="Helvetica Neue Medium"/>
-                <a:cs typeface="Helvetica Neue Medium"/>
-                <a:sym typeface="Helvetica Neue Medium"/>
-              </a:defRPr>
-            </a:lvl5pPr>
           </a:lstStyle>
           <a:p>
             <a:pPr/>
             <a:r>
               <a:t>“Notable Quote”</a:t>
-            </a:r>
-          </a:p>
-          <a:p>
-            <a:pPr lvl="1"/>
-            <a:r>
-              <a:t/>
-            </a:r>
-          </a:p>
-          <a:p>
-            <a:pPr lvl="2"/>
-            <a:r>
-              <a:t/>
-            </a:r>
-          </a:p>
-          <a:p>
-            <a:pPr lvl="3"/>
-            <a:r>
-              <a:t/>
-            </a:r>
-          </a:p>
-          <a:p>
-            <a:pPr lvl="4"/>
-            <a:r>
-              <a:t/>
             </a:r>
           </a:p>
         </p:txBody>
@@ -1337,7 +1313,7 @@
           </a:prstGeom>
         </p:spPr>
         <p:txBody>
-          <a:bodyPr lIns="91439" tIns="45719" rIns="91439" bIns="45719">
+          <a:bodyPr lIns="91439" tIns="45719" rIns="91439" bIns="45719" numCol="1" spcCol="38100">
             <a:noAutofit/>
           </a:bodyPr>
           <a:lstStyle/>
@@ -1364,7 +1340,7 @@
           </a:prstGeom>
         </p:spPr>
         <p:txBody>
-          <a:bodyPr lIns="91439" tIns="45719" rIns="91439" bIns="45719">
+          <a:bodyPr lIns="91439" tIns="45719" rIns="91439" bIns="45719" numCol="1" spcCol="38100">
             <a:noAutofit/>
           </a:bodyPr>
           <a:lstStyle/>
@@ -1391,7 +1367,7 @@
           </a:prstGeom>
         </p:spPr>
         <p:txBody>
-          <a:bodyPr lIns="91439" tIns="45719" rIns="91439" bIns="45719">
+          <a:bodyPr lIns="91439" tIns="45719" rIns="91439" bIns="45719" numCol="1" spcCol="38100">
             <a:noAutofit/>
           </a:bodyPr>
           <a:lstStyle/>
@@ -1466,7 +1442,7 @@
           </a:prstGeom>
         </p:spPr>
         <p:txBody>
-          <a:bodyPr lIns="91439" tIns="45719" rIns="91439" bIns="45719">
+          <a:bodyPr lIns="91439" tIns="45719" rIns="91439" bIns="45719" numCol="1" spcCol="38100">
             <a:noAutofit/>
           </a:bodyPr>
           <a:lstStyle/>
@@ -1597,7 +1573,7 @@
           </a:prstGeom>
         </p:spPr>
         <p:txBody>
-          <a:bodyPr lIns="91439" tIns="45719" rIns="91439" bIns="45719">
+          <a:bodyPr lIns="91439" tIns="45719" rIns="91439" bIns="45719" numCol="1" spcCol="38100">
             <a:noAutofit/>
           </a:bodyPr>
           <a:lstStyle/>
@@ -1640,23 +1616,23 @@
       </p:sp>
       <p:sp>
         <p:nvSpPr>
-          <p:cNvPr id="23" name="Author and Date"/>
+          <p:cNvPr id="23" name="Body Level One…"/>
           <p:cNvSpPr txBox="1"/>
           <p:nvPr>
-            <p:ph type="body" sz="quarter" idx="22" hasCustomPrompt="1"/>
+            <p:ph type="body" sz="quarter" idx="1" hasCustomPrompt="1"/>
           </p:nvPr>
         </p:nvSpPr>
         <p:spPr>
           <a:xfrm>
             <a:off x="1207690" y="1106137"/>
-            <a:ext cx="21968621" cy="636979"/>
+            <a:ext cx="21968621" cy="636980"/>
           </a:xfrm>
           <a:prstGeom prst="rect">
             <a:avLst/>
           </a:prstGeom>
         </p:spPr>
         <p:txBody>
-          <a:bodyPr lIns="45719" tIns="45719" rIns="45719" bIns="45719"/>
+          <a:bodyPr lIns="45718" tIns="45718" rIns="45718" bIns="45718" numCol="1" spcCol="38100"/>
           <a:lstStyle>
             <a:lvl1pPr marL="0" indent="0" defTabSz="825500">
               <a:lnSpc>
@@ -1669,11 +1645,71 @@
               <a:buNone/>
               <a:defRPr b="1" sz="3600"/>
             </a:lvl1pPr>
+            <a:lvl2pPr marL="1066800" indent="-457200" defTabSz="825500">
+              <a:lnSpc>
+                <a:spcPct val="100000"/>
+              </a:lnSpc>
+              <a:spcBef>
+                <a:spcPts val="0"/>
+              </a:spcBef>
+              <a:defRPr b="1" sz="3600"/>
+            </a:lvl2pPr>
+            <a:lvl3pPr marL="1676400" indent="-457200" defTabSz="825500">
+              <a:lnSpc>
+                <a:spcPct val="100000"/>
+              </a:lnSpc>
+              <a:spcBef>
+                <a:spcPts val="0"/>
+              </a:spcBef>
+              <a:defRPr b="1" sz="3600"/>
+            </a:lvl3pPr>
+            <a:lvl4pPr marL="2286000" indent="-457200" defTabSz="825500">
+              <a:lnSpc>
+                <a:spcPct val="100000"/>
+              </a:lnSpc>
+              <a:spcBef>
+                <a:spcPts val="0"/>
+              </a:spcBef>
+              <a:defRPr b="1" sz="3600"/>
+            </a:lvl4pPr>
+            <a:lvl5pPr marL="2895600" indent="-457200" defTabSz="825500">
+              <a:lnSpc>
+                <a:spcPct val="100000"/>
+              </a:lnSpc>
+              <a:spcBef>
+                <a:spcPts val="0"/>
+              </a:spcBef>
+              <a:defRPr b="1" sz="3600"/>
+            </a:lvl5pPr>
           </a:lstStyle>
           <a:p>
             <a:pPr/>
             <a:r>
               <a:t>Author and Date</a:t>
+            </a:r>
+          </a:p>
+          <a:p>
+            <a:pPr lvl="1"/>
+            <a:r>
+              <a:t/>
+            </a:r>
+          </a:p>
+          <a:p>
+            <a:pPr lvl="2"/>
+            <a:r>
+              <a:t/>
+            </a:r>
+          </a:p>
+          <a:p>
+            <a:pPr lvl="3"/>
+            <a:r>
+              <a:t/>
+            </a:r>
+          </a:p>
+          <a:p>
+            <a:pPr lvl="4"/>
+            <a:r>
+              <a:t/>
             </a:r>
           </a:p>
         </p:txBody>
@@ -1683,20 +1719,20 @@
           <p:cNvPr id="24" name="Body Level One…"/>
           <p:cNvSpPr txBox="1"/>
           <p:nvPr>
-            <p:ph type="body" sz="quarter" idx="1" hasCustomPrompt="1"/>
+            <p:ph type="body" sz="quarter" idx="22" hasCustomPrompt="1"/>
           </p:nvPr>
         </p:nvSpPr>
         <p:spPr>
           <a:xfrm>
-            <a:off x="1206500" y="11609910"/>
-            <a:ext cx="21971000" cy="1116952"/>
+            <a:off x="1206500" y="11609909"/>
+            <a:ext cx="21971000" cy="1116953"/>
           </a:xfrm>
           <a:prstGeom prst="rect">
             <a:avLst/>
           </a:prstGeom>
         </p:spPr>
         <p:txBody>
-          <a:bodyPr/>
+          <a:bodyPr numCol="1" spcCol="38100"/>
           <a:lstStyle>
             <a:lvl1pPr marL="0" indent="0" defTabSz="825500">
               <a:lnSpc>
@@ -1709,79 +1745,11 @@
               <a:buNone/>
               <a:defRPr b="1" sz="5500"/>
             </a:lvl1pPr>
-            <a:lvl2pPr marL="0" indent="457200" defTabSz="825500">
-              <a:lnSpc>
-                <a:spcPct val="100000"/>
-              </a:lnSpc>
-              <a:spcBef>
-                <a:spcPts val="0"/>
-              </a:spcBef>
-              <a:buSzTx/>
-              <a:buNone/>
-              <a:defRPr b="1" sz="5500"/>
-            </a:lvl2pPr>
-            <a:lvl3pPr marL="0" indent="914400" defTabSz="825500">
-              <a:lnSpc>
-                <a:spcPct val="100000"/>
-              </a:lnSpc>
-              <a:spcBef>
-                <a:spcPts val="0"/>
-              </a:spcBef>
-              <a:buSzTx/>
-              <a:buNone/>
-              <a:defRPr b="1" sz="5500"/>
-            </a:lvl3pPr>
-            <a:lvl4pPr marL="0" indent="1371600" defTabSz="825500">
-              <a:lnSpc>
-                <a:spcPct val="100000"/>
-              </a:lnSpc>
-              <a:spcBef>
-                <a:spcPts val="0"/>
-              </a:spcBef>
-              <a:buSzTx/>
-              <a:buNone/>
-              <a:defRPr b="1" sz="5500"/>
-            </a:lvl4pPr>
-            <a:lvl5pPr marL="0" indent="1828800" defTabSz="825500">
-              <a:lnSpc>
-                <a:spcPct val="100000"/>
-              </a:lnSpc>
-              <a:spcBef>
-                <a:spcPts val="0"/>
-              </a:spcBef>
-              <a:buSzTx/>
-              <a:buNone/>
-              <a:defRPr b="1" sz="5500"/>
-            </a:lvl5pPr>
           </a:lstStyle>
           <a:p>
             <a:pPr/>
             <a:r>
               <a:t>Presentation Subtitle</a:t>
-            </a:r>
-          </a:p>
-          <a:p>
-            <a:pPr lvl="1"/>
-            <a:r>
-              <a:t/>
-            </a:r>
-          </a:p>
-          <a:p>
-            <a:pPr lvl="2"/>
-            <a:r>
-              <a:t/>
-            </a:r>
-          </a:p>
-          <a:p>
-            <a:pPr lvl="3"/>
-            <a:r>
-              <a:t/>
-            </a:r>
-          </a:p>
-          <a:p>
-            <a:pPr lvl="4"/>
-            <a:r>
-              <a:t/>
             </a:r>
           </a:p>
         </p:txBody>
@@ -1852,7 +1820,7 @@
           </a:prstGeom>
         </p:spPr>
         <p:txBody>
-          <a:bodyPr lIns="91439" tIns="45719" rIns="91439" bIns="45719">
+          <a:bodyPr lIns="91439" tIns="45719" rIns="91439" bIns="45719" numCol="1" spcCol="38100">
             <a:noAutofit/>
           </a:bodyPr>
           <a:lstStyle/>
@@ -1872,7 +1840,7 @@
         <p:spPr>
           <a:xfrm>
             <a:off x="1206500" y="1270000"/>
-            <a:ext cx="9779000" cy="5882273"/>
+            <a:ext cx="9779000" cy="5882274"/>
           </a:xfrm>
           <a:prstGeom prst="rect">
             <a:avLst/>
@@ -1907,7 +1875,7 @@
           </a:prstGeom>
         </p:spPr>
         <p:txBody>
-          <a:bodyPr/>
+          <a:bodyPr numCol="1" spcCol="38100"/>
           <a:lstStyle>
             <a:lvl1pPr marL="0" indent="0" defTabSz="825500">
               <a:lnSpc>
@@ -1920,7 +1888,7 @@
               <a:buNone/>
               <a:defRPr b="1" sz="5500"/>
             </a:lvl1pPr>
-            <a:lvl2pPr marL="0" indent="457200" defTabSz="825500">
+            <a:lvl2pPr marL="0" indent="0" defTabSz="825500">
               <a:lnSpc>
                 <a:spcPct val="100000"/>
               </a:lnSpc>
@@ -1931,7 +1899,7 @@
               <a:buNone/>
               <a:defRPr b="1" sz="5500"/>
             </a:lvl2pPr>
-            <a:lvl3pPr marL="0" indent="914400" defTabSz="825500">
+            <a:lvl3pPr marL="0" indent="0" defTabSz="825500">
               <a:lnSpc>
                 <a:spcPct val="100000"/>
               </a:lnSpc>
@@ -1942,7 +1910,7 @@
               <a:buNone/>
               <a:defRPr b="1" sz="5500"/>
             </a:lvl3pPr>
-            <a:lvl4pPr marL="0" indent="1371600" defTabSz="825500">
+            <a:lvl4pPr marL="0" indent="0" defTabSz="825500">
               <a:lnSpc>
                 <a:spcPct val="100000"/>
               </a:lnSpc>
@@ -1953,7 +1921,7 @@
               <a:buNone/>
               <a:defRPr b="1" sz="5500"/>
             </a:lvl4pPr>
-            <a:lvl5pPr marL="0" indent="1828800" defTabSz="825500">
+            <a:lvl5pPr marL="0" indent="0" defTabSz="825500">
               <a:lnSpc>
                 <a:spcPct val="100000"/>
               </a:lnSpc>
@@ -2007,8 +1975,8 @@
         </p:nvSpPr>
         <p:spPr>
           <a:xfrm>
-            <a:off x="12001499" y="13085233"/>
-            <a:ext cx="368505" cy="374600"/>
+            <a:off x="12001500" y="13085233"/>
+            <a:ext cx="368504" cy="374600"/>
           </a:xfrm>
           <a:prstGeom prst="rect">
             <a:avLst/>
@@ -2058,6 +2026,10 @@
           </p:nvPr>
         </p:nvSpPr>
         <p:spPr>
+          <a:xfrm>
+            <a:off x="1206500" y="1079500"/>
+            <a:ext cx="21971000" cy="1433164"/>
+          </a:xfrm>
           <a:prstGeom prst="rect">
             <a:avLst/>
           </a:prstGeom>
@@ -2075,23 +2047,23 @@
       </p:sp>
       <p:sp>
         <p:nvSpPr>
-          <p:cNvPr id="43" name="Slide Subtitle"/>
+          <p:cNvPr id="43" name="Body Level One…"/>
           <p:cNvSpPr txBox="1"/>
           <p:nvPr>
-            <p:ph type="body" sz="quarter" idx="21" hasCustomPrompt="1"/>
+            <p:ph type="body" sz="quarter" idx="1" hasCustomPrompt="1"/>
           </p:nvPr>
         </p:nvSpPr>
         <p:spPr>
           <a:xfrm>
-            <a:off x="1206500" y="2372962"/>
-            <a:ext cx="21971000" cy="934780"/>
+            <a:off x="1206500" y="2372961"/>
+            <a:ext cx="21971000" cy="934781"/>
           </a:xfrm>
           <a:prstGeom prst="rect">
             <a:avLst/>
           </a:prstGeom>
         </p:spPr>
         <p:txBody>
-          <a:bodyPr lIns="45719" tIns="45719" rIns="45719" bIns="45719"/>
+          <a:bodyPr lIns="45718" tIns="45718" rIns="45718" bIns="45718" numCol="1" spcCol="38100"/>
           <a:lstStyle>
             <a:lvl1pPr marL="0" indent="0" defTabSz="825500">
               <a:lnSpc>
@@ -2104,11 +2076,71 @@
               <a:buNone/>
               <a:defRPr b="1" sz="5500"/>
             </a:lvl1pPr>
+            <a:lvl2pPr marL="1308100" indent="-698500" defTabSz="825500">
+              <a:lnSpc>
+                <a:spcPct val="100000"/>
+              </a:lnSpc>
+              <a:spcBef>
+                <a:spcPts val="0"/>
+              </a:spcBef>
+              <a:defRPr b="1" sz="5500"/>
+            </a:lvl2pPr>
+            <a:lvl3pPr marL="1917700" indent="-698500" defTabSz="825500">
+              <a:lnSpc>
+                <a:spcPct val="100000"/>
+              </a:lnSpc>
+              <a:spcBef>
+                <a:spcPts val="0"/>
+              </a:spcBef>
+              <a:defRPr b="1" sz="5500"/>
+            </a:lvl3pPr>
+            <a:lvl4pPr marL="2527300" indent="-698500" defTabSz="825500">
+              <a:lnSpc>
+                <a:spcPct val="100000"/>
+              </a:lnSpc>
+              <a:spcBef>
+                <a:spcPts val="0"/>
+              </a:spcBef>
+              <a:defRPr b="1" sz="5500"/>
+            </a:lvl4pPr>
+            <a:lvl5pPr marL="3136900" indent="-698500" defTabSz="825500">
+              <a:lnSpc>
+                <a:spcPct val="100000"/>
+              </a:lnSpc>
+              <a:spcBef>
+                <a:spcPts val="0"/>
+              </a:spcBef>
+              <a:defRPr b="1" sz="5500"/>
+            </a:lvl5pPr>
           </a:lstStyle>
           <a:p>
             <a:pPr/>
             <a:r>
               <a:t>Slide Subtitle</a:t>
+            </a:r>
+          </a:p>
+          <a:p>
+            <a:pPr lvl="1"/>
+            <a:r>
+              <a:t/>
+            </a:r>
+          </a:p>
+          <a:p>
+            <a:pPr lvl="2"/>
+            <a:r>
+              <a:t/>
+            </a:r>
+          </a:p>
+          <a:p>
+            <a:pPr lvl="3"/>
+            <a:r>
+              <a:t/>
+            </a:r>
+          </a:p>
+          <a:p>
+            <a:pPr lvl="4"/>
+            <a:r>
+              <a:t/>
             </a:r>
           </a:p>
         </p:txBody>
@@ -2118,45 +2150,25 @@
           <p:cNvPr id="44" name="Body Level One…"/>
           <p:cNvSpPr txBox="1"/>
           <p:nvPr>
-            <p:ph type="body" idx="1" hasCustomPrompt="1"/>
+            <p:ph type="body" idx="21" hasCustomPrompt="1"/>
           </p:nvPr>
         </p:nvSpPr>
         <p:spPr>
+          <a:xfrm>
+            <a:off x="1206500" y="4248503"/>
+            <a:ext cx="21971000" cy="8256014"/>
+          </a:xfrm>
           <a:prstGeom prst="rect">
             <a:avLst/>
           </a:prstGeom>
         </p:spPr>
         <p:txBody>
-          <a:bodyPr/>
+          <a:bodyPr numCol="1" spcCol="38100"/>
           <a:lstStyle/>
           <a:p>
             <a:pPr/>
             <a:r>
               <a:t>Slide bullet text</a:t>
-            </a:r>
-          </a:p>
-          <a:p>
-            <a:pPr lvl="1"/>
-            <a:r>
-              <a:t/>
-            </a:r>
-          </a:p>
-          <a:p>
-            <a:pPr lvl="2"/>
-            <a:r>
-              <a:t/>
-            </a:r>
-          </a:p>
-          <a:p>
-            <a:pPr lvl="3"/>
-            <a:r>
-              <a:t/>
-            </a:r>
-          </a:p>
-          <a:p>
-            <a:pPr lvl="4"/>
-            <a:r>
-              <a:t/>
             </a:r>
           </a:p>
         </p:txBody>
@@ -2223,7 +2235,7 @@
           </a:prstGeom>
         </p:spPr>
         <p:txBody>
-          <a:bodyPr numCol="2" spcCol="1098550"/>
+          <a:bodyPr/>
           <a:lstStyle/>
           <a:p>
             <a:pPr/>
@@ -2307,23 +2319,23 @@
       </p:grpSpPr>
       <p:sp>
         <p:nvSpPr>
-          <p:cNvPr id="60" name="Slide Subtitle"/>
+          <p:cNvPr id="60" name="Body Level One…"/>
           <p:cNvSpPr txBox="1"/>
           <p:nvPr>
-            <p:ph type="body" sz="quarter" idx="21" hasCustomPrompt="1"/>
+            <p:ph type="body" sz="quarter" idx="1" hasCustomPrompt="1"/>
           </p:nvPr>
         </p:nvSpPr>
         <p:spPr>
           <a:xfrm>
-            <a:off x="1206500" y="2372962"/>
-            <a:ext cx="9779000" cy="934780"/>
+            <a:off x="1206500" y="2372961"/>
+            <a:ext cx="9779000" cy="934781"/>
           </a:xfrm>
           <a:prstGeom prst="rect">
             <a:avLst/>
           </a:prstGeom>
         </p:spPr>
         <p:txBody>
-          <a:bodyPr lIns="45719" tIns="45719" rIns="45719" bIns="45719"/>
+          <a:bodyPr lIns="45718" tIns="45718" rIns="45718" bIns="45718" numCol="1" spcCol="38100"/>
           <a:lstStyle>
             <a:lvl1pPr marL="0" indent="0" defTabSz="825500">
               <a:lnSpc>
@@ -2336,11 +2348,71 @@
               <a:buNone/>
               <a:defRPr b="1" sz="5500"/>
             </a:lvl1pPr>
+            <a:lvl2pPr marL="1308100" indent="-698500" defTabSz="825500">
+              <a:lnSpc>
+                <a:spcPct val="100000"/>
+              </a:lnSpc>
+              <a:spcBef>
+                <a:spcPts val="0"/>
+              </a:spcBef>
+              <a:defRPr b="1" sz="5500"/>
+            </a:lvl2pPr>
+            <a:lvl3pPr marL="1917700" indent="-698500" defTabSz="825500">
+              <a:lnSpc>
+                <a:spcPct val="100000"/>
+              </a:lnSpc>
+              <a:spcBef>
+                <a:spcPts val="0"/>
+              </a:spcBef>
+              <a:defRPr b="1" sz="5500"/>
+            </a:lvl3pPr>
+            <a:lvl4pPr marL="2527300" indent="-698500" defTabSz="825500">
+              <a:lnSpc>
+                <a:spcPct val="100000"/>
+              </a:lnSpc>
+              <a:spcBef>
+                <a:spcPts val="0"/>
+              </a:spcBef>
+              <a:defRPr b="1" sz="5500"/>
+            </a:lvl4pPr>
+            <a:lvl5pPr marL="3136900" indent="-698500" defTabSz="825500">
+              <a:lnSpc>
+                <a:spcPct val="100000"/>
+              </a:lnSpc>
+              <a:spcBef>
+                <a:spcPts val="0"/>
+              </a:spcBef>
+              <a:defRPr b="1" sz="5500"/>
+            </a:lvl5pPr>
           </a:lstStyle>
           <a:p>
             <a:pPr/>
             <a:r>
               <a:t>Slide Subtitle</a:t>
+            </a:r>
+          </a:p>
+          <a:p>
+            <a:pPr lvl="1"/>
+            <a:r>
+              <a:t/>
+            </a:r>
+          </a:p>
+          <a:p>
+            <a:pPr lvl="2"/>
+            <a:r>
+              <a:t/>
+            </a:r>
+          </a:p>
+          <a:p>
+            <a:pPr lvl="3"/>
+            <a:r>
+              <a:t/>
+            </a:r>
+          </a:p>
+          <a:p>
+            <a:pPr lvl="4"/>
+            <a:r>
+              <a:t/>
             </a:r>
           </a:p>
         </p:txBody>
@@ -2350,49 +2422,25 @@
           <p:cNvPr id="61" name="Body Level One…"/>
           <p:cNvSpPr txBox="1"/>
           <p:nvPr>
-            <p:ph type="body" sz="half" idx="1" hasCustomPrompt="1"/>
+            <p:ph type="body" sz="half" idx="21" hasCustomPrompt="1"/>
           </p:nvPr>
         </p:nvSpPr>
         <p:spPr>
           <a:xfrm>
-            <a:off x="1206500" y="4248504"/>
-            <a:ext cx="9779000" cy="8256630"/>
+            <a:off x="1206500" y="4248503"/>
+            <a:ext cx="9779000" cy="8256631"/>
           </a:xfrm>
           <a:prstGeom prst="rect">
             <a:avLst/>
           </a:prstGeom>
         </p:spPr>
         <p:txBody>
-          <a:bodyPr/>
+          <a:bodyPr numCol="1" spcCol="38100"/>
           <a:lstStyle/>
           <a:p>
             <a:pPr/>
             <a:r>
               <a:t>Slide bullet text</a:t>
-            </a:r>
-          </a:p>
-          <a:p>
-            <a:pPr lvl="1"/>
-            <a:r>
-              <a:t/>
-            </a:r>
-          </a:p>
-          <a:p>
-            <a:pPr lvl="2"/>
-            <a:r>
-              <a:t/>
-            </a:r>
-          </a:p>
-          <a:p>
-            <a:pPr lvl="3"/>
-            <a:r>
-              <a:t/>
-            </a:r>
-          </a:p>
-          <a:p>
-            <a:pPr lvl="4"/>
-            <a:r>
-              <a:t/>
             </a:r>
           </a:p>
         </p:txBody>
@@ -2408,14 +2456,14 @@
         <p:spPr>
           <a:xfrm>
             <a:off x="12192000" y="-407266"/>
-            <a:ext cx="10916874" cy="14555832"/>
+            <a:ext cx="10916874" cy="14555833"/>
           </a:xfrm>
           <a:prstGeom prst="rect">
             <a:avLst/>
           </a:prstGeom>
         </p:spPr>
         <p:txBody>
-          <a:bodyPr lIns="91439" tIns="45719" rIns="91439" bIns="45719">
+          <a:bodyPr lIns="91439" tIns="45719" rIns="91439" bIns="45719" numCol="1" spcCol="38100">
             <a:noAutofit/>
           </a:bodyPr>
           <a:lstStyle/>
@@ -2511,7 +2559,7 @@
         <p:spPr>
           <a:xfrm>
             <a:off x="1206496" y="4533900"/>
-            <a:ext cx="21971004" cy="4648200"/>
+            <a:ext cx="21971005" cy="4648200"/>
           </a:xfrm>
           <a:prstGeom prst="rect">
             <a:avLst/>
@@ -2547,8 +2595,8 @@
         </p:nvSpPr>
         <p:spPr>
           <a:xfrm>
-            <a:off x="12001499" y="13085233"/>
-            <a:ext cx="368505" cy="374600"/>
+            <a:off x="12001500" y="13085233"/>
+            <a:ext cx="368504" cy="374600"/>
           </a:xfrm>
           <a:prstGeom prst="rect">
             <a:avLst/>
@@ -2600,7 +2648,7 @@
         <p:spPr>
           <a:xfrm>
             <a:off x="1206500" y="1079500"/>
-            <a:ext cx="21971000" cy="1434949"/>
+            <a:ext cx="21971000" cy="1434950"/>
           </a:xfrm>
           <a:prstGeom prst="rect">
             <a:avLst/>
@@ -2619,23 +2667,23 @@
       </p:sp>
       <p:sp>
         <p:nvSpPr>
-          <p:cNvPr id="80" name="Slide Subtitle"/>
+          <p:cNvPr id="80" name="Body Level One…"/>
           <p:cNvSpPr txBox="1"/>
           <p:nvPr>
-            <p:ph type="body" sz="quarter" idx="21" hasCustomPrompt="1"/>
+            <p:ph type="body" sz="quarter" idx="1" hasCustomPrompt="1"/>
           </p:nvPr>
         </p:nvSpPr>
         <p:spPr>
           <a:xfrm>
-            <a:off x="1206500" y="2372962"/>
-            <a:ext cx="21971000" cy="934780"/>
+            <a:off x="1206500" y="2372961"/>
+            <a:ext cx="21971000" cy="934781"/>
           </a:xfrm>
           <a:prstGeom prst="rect">
             <a:avLst/>
           </a:prstGeom>
         </p:spPr>
         <p:txBody>
-          <a:bodyPr lIns="45719" tIns="45719" rIns="45719" bIns="45719"/>
+          <a:bodyPr lIns="45718" tIns="45718" rIns="45718" bIns="45718" numCol="1" spcCol="38100"/>
           <a:lstStyle>
             <a:lvl1pPr marL="0" indent="0" defTabSz="825500">
               <a:lnSpc>
@@ -2648,11 +2696,71 @@
               <a:buNone/>
               <a:defRPr b="1" sz="5500"/>
             </a:lvl1pPr>
+            <a:lvl2pPr marL="1308100" indent="-698500" defTabSz="825500">
+              <a:lnSpc>
+                <a:spcPct val="100000"/>
+              </a:lnSpc>
+              <a:spcBef>
+                <a:spcPts val="0"/>
+              </a:spcBef>
+              <a:defRPr b="1" sz="5500"/>
+            </a:lvl2pPr>
+            <a:lvl3pPr marL="1917700" indent="-698500" defTabSz="825500">
+              <a:lnSpc>
+                <a:spcPct val="100000"/>
+              </a:lnSpc>
+              <a:spcBef>
+                <a:spcPts val="0"/>
+              </a:spcBef>
+              <a:defRPr b="1" sz="5500"/>
+            </a:lvl3pPr>
+            <a:lvl4pPr marL="2527300" indent="-698500" defTabSz="825500">
+              <a:lnSpc>
+                <a:spcPct val="100000"/>
+              </a:lnSpc>
+              <a:spcBef>
+                <a:spcPts val="0"/>
+              </a:spcBef>
+              <a:defRPr b="1" sz="5500"/>
+            </a:lvl4pPr>
+            <a:lvl5pPr marL="3136900" indent="-698500" defTabSz="825500">
+              <a:lnSpc>
+                <a:spcPct val="100000"/>
+              </a:lnSpc>
+              <a:spcBef>
+                <a:spcPts val="0"/>
+              </a:spcBef>
+              <a:defRPr b="1" sz="5500"/>
+            </a:lvl5pPr>
           </a:lstStyle>
           <a:p>
             <a:pPr/>
             <a:r>
               <a:t>Slide Subtitle</a:t>
+            </a:r>
+          </a:p>
+          <a:p>
+            <a:pPr lvl="1"/>
+            <a:r>
+              <a:t/>
+            </a:r>
+          </a:p>
+          <a:p>
+            <a:pPr lvl="2"/>
+            <a:r>
+              <a:t/>
+            </a:r>
+          </a:p>
+          <a:p>
+            <a:pPr lvl="3"/>
+            <a:r>
+              <a:t/>
+            </a:r>
+          </a:p>
+          <a:p>
+            <a:pPr lvl="4"/>
+            <a:r>
+              <a:t/>
             </a:r>
           </a:p>
         </p:txBody>
@@ -2735,23 +2843,23 @@
       </p:sp>
       <p:sp>
         <p:nvSpPr>
-          <p:cNvPr id="89" name="Agenda Subtitle"/>
+          <p:cNvPr id="89" name="Body Level One…"/>
           <p:cNvSpPr txBox="1"/>
           <p:nvPr>
-            <p:ph type="body" sz="quarter" idx="21" hasCustomPrompt="1"/>
+            <p:ph type="body" sz="quarter" idx="1" hasCustomPrompt="1"/>
           </p:nvPr>
         </p:nvSpPr>
         <p:spPr>
           <a:xfrm>
-            <a:off x="1206500" y="2372962"/>
-            <a:ext cx="21971000" cy="934780"/>
+            <a:off x="1206500" y="2372961"/>
+            <a:ext cx="21971000" cy="934781"/>
           </a:xfrm>
           <a:prstGeom prst="rect">
             <a:avLst/>
           </a:prstGeom>
         </p:spPr>
         <p:txBody>
-          <a:bodyPr lIns="45719" tIns="45719" rIns="45719" bIns="45719"/>
+          <a:bodyPr lIns="45718" tIns="45718" rIns="45718" bIns="45718" numCol="1" spcCol="38100"/>
           <a:lstStyle>
             <a:lvl1pPr marL="0" indent="0" defTabSz="825500">
               <a:lnSpc>
@@ -2764,11 +2872,71 @@
               <a:buNone/>
               <a:defRPr b="1" sz="5500"/>
             </a:lvl1pPr>
+            <a:lvl2pPr marL="1308100" indent="-698500" defTabSz="825500">
+              <a:lnSpc>
+                <a:spcPct val="100000"/>
+              </a:lnSpc>
+              <a:spcBef>
+                <a:spcPts val="0"/>
+              </a:spcBef>
+              <a:defRPr b="1" sz="5500"/>
+            </a:lvl2pPr>
+            <a:lvl3pPr marL="1917700" indent="-698500" defTabSz="825500">
+              <a:lnSpc>
+                <a:spcPct val="100000"/>
+              </a:lnSpc>
+              <a:spcBef>
+                <a:spcPts val="0"/>
+              </a:spcBef>
+              <a:defRPr b="1" sz="5500"/>
+            </a:lvl3pPr>
+            <a:lvl4pPr marL="2527300" indent="-698500" defTabSz="825500">
+              <a:lnSpc>
+                <a:spcPct val="100000"/>
+              </a:lnSpc>
+              <a:spcBef>
+                <a:spcPts val="0"/>
+              </a:spcBef>
+              <a:defRPr b="1" sz="5500"/>
+            </a:lvl4pPr>
+            <a:lvl5pPr marL="3136900" indent="-698500" defTabSz="825500">
+              <a:lnSpc>
+                <a:spcPct val="100000"/>
+              </a:lnSpc>
+              <a:spcBef>
+                <a:spcPts val="0"/>
+              </a:spcBef>
+              <a:defRPr b="1" sz="5500"/>
+            </a:lvl5pPr>
           </a:lstStyle>
           <a:p>
             <a:pPr/>
             <a:r>
               <a:t>Agenda Subtitle</a:t>
+            </a:r>
+          </a:p>
+          <a:p>
+            <a:pPr lvl="1"/>
+            <a:r>
+              <a:t/>
+            </a:r>
+          </a:p>
+          <a:p>
+            <a:pPr lvl="2"/>
+            <a:r>
+              <a:t/>
+            </a:r>
+          </a:p>
+          <a:p>
+            <a:pPr lvl="3"/>
+            <a:r>
+              <a:t/>
+            </a:r>
+          </a:p>
+          <a:p>
+            <a:pPr lvl="4"/>
+            <a:r>
+              <a:t/>
             </a:r>
           </a:p>
         </p:txBody>
@@ -2778,16 +2946,20 @@
           <p:cNvPr id="90" name="Body Level One…"/>
           <p:cNvSpPr txBox="1"/>
           <p:nvPr>
-            <p:ph type="body" idx="1" hasCustomPrompt="1"/>
+            <p:ph type="body" idx="21" hasCustomPrompt="1"/>
           </p:nvPr>
         </p:nvSpPr>
         <p:spPr>
+          <a:xfrm>
+            <a:off x="1206500" y="4248503"/>
+            <a:ext cx="21971000" cy="8256014"/>
+          </a:xfrm>
           <a:prstGeom prst="rect">
             <a:avLst/>
           </a:prstGeom>
         </p:spPr>
         <p:txBody>
-          <a:bodyPr/>
+          <a:bodyPr numCol="1" spcCol="38100"/>
           <a:lstStyle>
             <a:lvl1pPr marL="0" indent="0" defTabSz="825500">
               <a:lnSpc>
@@ -2798,81 +2970,13 @@
               </a:spcBef>
               <a:buSzTx/>
               <a:buNone/>
-              <a:defRPr spc="-55" sz="5500"/>
+              <a:defRPr spc="-99" sz="5500"/>
             </a:lvl1pPr>
-            <a:lvl2pPr marL="0" indent="457200" defTabSz="825500">
-              <a:lnSpc>
-                <a:spcPct val="100000"/>
-              </a:lnSpc>
-              <a:spcBef>
-                <a:spcPts val="1800"/>
-              </a:spcBef>
-              <a:buSzTx/>
-              <a:buNone/>
-              <a:defRPr spc="-55" sz="5500"/>
-            </a:lvl2pPr>
-            <a:lvl3pPr marL="0" indent="914400" defTabSz="825500">
-              <a:lnSpc>
-                <a:spcPct val="100000"/>
-              </a:lnSpc>
-              <a:spcBef>
-                <a:spcPts val="1800"/>
-              </a:spcBef>
-              <a:buSzTx/>
-              <a:buNone/>
-              <a:defRPr spc="-55" sz="5500"/>
-            </a:lvl3pPr>
-            <a:lvl4pPr marL="0" indent="1371600" defTabSz="825500">
-              <a:lnSpc>
-                <a:spcPct val="100000"/>
-              </a:lnSpc>
-              <a:spcBef>
-                <a:spcPts val="1800"/>
-              </a:spcBef>
-              <a:buSzTx/>
-              <a:buNone/>
-              <a:defRPr spc="-55" sz="5500"/>
-            </a:lvl4pPr>
-            <a:lvl5pPr marL="0" indent="1828800" defTabSz="825500">
-              <a:lnSpc>
-                <a:spcPct val="100000"/>
-              </a:lnSpc>
-              <a:spcBef>
-                <a:spcPts val="1800"/>
-              </a:spcBef>
-              <a:buSzTx/>
-              <a:buNone/>
-              <a:defRPr spc="-55" sz="5500"/>
-            </a:lvl5pPr>
           </a:lstStyle>
           <a:p>
             <a:pPr/>
             <a:r>
               <a:t>Agenda Topics</a:t>
-            </a:r>
-          </a:p>
-          <a:p>
-            <a:pPr lvl="1"/>
-            <a:r>
-              <a:t/>
-            </a:r>
-          </a:p>
-          <a:p>
-            <a:pPr lvl="2"/>
-            <a:r>
-              <a:t/>
-            </a:r>
-          </a:p>
-          <a:p>
-            <a:pPr lvl="3"/>
-            <a:r>
-              <a:t/>
-            </a:r>
-          </a:p>
-          <a:p>
-            <a:pPr lvl="4"/>
-            <a:r>
-              <a:t/>
             </a:r>
           </a:p>
         </p:txBody>
@@ -2934,16 +3038,78 @@
       </p:grpSpPr>
       <p:sp>
         <p:nvSpPr>
-          <p:cNvPr id="2" name="Slide Title"/>
+          <p:cNvPr id="2" name="Body Level One…"/>
           <p:cNvSpPr txBox="1"/>
           <p:nvPr>
-            <p:ph type="title" hasCustomPrompt="1"/>
+            <p:ph type="body" idx="1" hasCustomPrompt="1"/>
           </p:nvPr>
         </p:nvSpPr>
         <p:spPr>
           <a:xfrm>
-            <a:off x="1206500" y="1079500"/>
-            <a:ext cx="21971000" cy="1433163"/>
+            <a:off x="1206500" y="4248503"/>
+            <a:ext cx="21971000" cy="8256014"/>
+          </a:xfrm>
+          <a:prstGeom prst="rect">
+            <a:avLst/>
+          </a:prstGeom>
+          <a:ln w="12700">
+            <a:miter lim="400000"/>
+          </a:ln>
+          <a:extLst>
+            <a:ext uri="{C572A759-6A51-4108-AA02-DFA0A04FC94B}">
+              <ma14:wrappingTextBoxFlag xmlns:ma14="http://schemas.microsoft.com/office/mac/drawingml/2011/main" val="1"/>
+            </a:ext>
+          </a:extLst>
+        </p:spPr>
+        <p:txBody>
+          <a:bodyPr lIns="50800" tIns="50800" rIns="50800" bIns="50800" numCol="2" spcCol="1098550">
+            <a:normAutofit fontScale="100000" lnSpcReduction="0"/>
+          </a:bodyPr>
+          <a:lstStyle/>
+          <a:p>
+            <a:pPr/>
+            <a:r>
+              <a:t>Slide bullet text</a:t>
+            </a:r>
+          </a:p>
+          <a:p>
+            <a:pPr lvl="1"/>
+            <a:r>
+              <a:t/>
+            </a:r>
+          </a:p>
+          <a:p>
+            <a:pPr lvl="2"/>
+            <a:r>
+              <a:t/>
+            </a:r>
+          </a:p>
+          <a:p>
+            <a:pPr lvl="3"/>
+            <a:r>
+              <a:t/>
+            </a:r>
+          </a:p>
+          <a:p>
+            <a:pPr lvl="4"/>
+            <a:r>
+              <a:t/>
+            </a:r>
+          </a:p>
+        </p:txBody>
+      </p:sp>
+      <p:sp>
+        <p:nvSpPr>
+          <p:cNvPr id="3" name="Title Text"/>
+          <p:cNvSpPr txBox="1"/>
+          <p:nvPr>
+            <p:ph type="title"/>
+          </p:nvPr>
+        </p:nvSpPr>
+        <p:spPr>
+          <a:xfrm>
+            <a:off x="3653366" y="2743200"/>
+            <a:ext cx="19507201" cy="1505304"/>
           </a:xfrm>
           <a:prstGeom prst="rect">
             <a:avLst/>
@@ -2965,69 +3131,7 @@
           <a:p>
             <a:pPr/>
             <a:r>
-              <a:t>Slide Title</a:t>
-            </a:r>
-          </a:p>
-        </p:txBody>
-      </p:sp>
-      <p:sp>
-        <p:nvSpPr>
-          <p:cNvPr id="3" name="Body Level One…"/>
-          <p:cNvSpPr txBox="1"/>
-          <p:nvPr>
-            <p:ph type="body" idx="1" hasCustomPrompt="1"/>
-          </p:nvPr>
-        </p:nvSpPr>
-        <p:spPr>
-          <a:xfrm>
-            <a:off x="1206500" y="4248504"/>
-            <a:ext cx="21971000" cy="8256012"/>
-          </a:xfrm>
-          <a:prstGeom prst="rect">
-            <a:avLst/>
-          </a:prstGeom>
-          <a:ln w="12700">
-            <a:miter lim="400000"/>
-          </a:ln>
-          <a:extLst>
-            <a:ext uri="{C572A759-6A51-4108-AA02-DFA0A04FC94B}">
-              <ma14:wrappingTextBoxFlag xmlns:ma14="http://schemas.microsoft.com/office/mac/drawingml/2011/main" val="1"/>
-            </a:ext>
-          </a:extLst>
-        </p:spPr>
-        <p:txBody>
-          <a:bodyPr lIns="50800" tIns="50800" rIns="50800" bIns="50800">
-            <a:normAutofit fontScale="100000" lnSpcReduction="0"/>
-          </a:bodyPr>
-          <a:lstStyle/>
-          <a:p>
-            <a:pPr/>
-            <a:r>
-              <a:t>Slide bullet text</a:t>
-            </a:r>
-          </a:p>
-          <a:p>
-            <a:pPr lvl="1"/>
-            <a:r>
-              <a:t/>
-            </a:r>
-          </a:p>
-          <a:p>
-            <a:pPr lvl="2"/>
-            <a:r>
-              <a:t/>
-            </a:r>
-          </a:p>
-          <a:p>
-            <a:pPr lvl="3"/>
-            <a:r>
-              <a:t/>
-            </a:r>
-          </a:p>
-          <a:p>
-            <a:pPr lvl="4"/>
-            <a:r>
-              <a:t/>
+              <a:t>Title Text</a:t>
             </a:r>
           </a:p>
         </p:txBody>
@@ -3042,8 +3146,8 @@
         </p:nvSpPr>
         <p:spPr>
           <a:xfrm>
-            <a:off x="12001499" y="13080999"/>
-            <a:ext cx="368505" cy="374600"/>
+            <a:off x="12001500" y="13080999"/>
+            <a:ext cx="368504" cy="374600"/>
           </a:xfrm>
           <a:prstGeom prst="rect">
             <a:avLst/>
@@ -3094,7 +3198,7 @@
   <p:transition xmlns:p14="http://schemas.microsoft.com/office/powerpoint/2010/main" spd="med" advClick="1"/>
   <p:txStyles>
     <p:titleStyle>
-      <a:lvl1pPr marL="0" marR="0" indent="0" algn="l" defTabSz="2438338" rtl="0" latinLnBrk="0">
+      <a:lvl1pPr marL="0" marR="0" indent="0" algn="l" defTabSz="2438337" rtl="0" latinLnBrk="0">
         <a:lnSpc>
           <a:spcPct val="80000"/>
         </a:lnSpc>
@@ -3114,13 +3218,13 @@
             <a:srgbClr val="000000"/>
           </a:solidFill>
           <a:uFillTx/>
-          <a:latin typeface="+mn-lt"/>
-          <a:ea typeface="+mn-ea"/>
-          <a:cs typeface="+mn-cs"/>
+          <a:latin typeface="+mj-lt"/>
+          <a:ea typeface="+mj-ea"/>
+          <a:cs typeface="+mj-cs"/>
           <a:sym typeface="Helvetica Neue"/>
         </a:defRPr>
       </a:lvl1pPr>
-      <a:lvl2pPr marL="0" marR="0" indent="457200" algn="l" defTabSz="2438338" rtl="0" latinLnBrk="0">
+      <a:lvl2pPr marL="0" marR="0" indent="0" algn="l" defTabSz="2438337" rtl="0" latinLnBrk="0">
         <a:lnSpc>
           <a:spcPct val="80000"/>
         </a:lnSpc>
@@ -3140,13 +3244,13 @@
             <a:srgbClr val="000000"/>
           </a:solidFill>
           <a:uFillTx/>
-          <a:latin typeface="+mn-lt"/>
-          <a:ea typeface="+mn-ea"/>
-          <a:cs typeface="+mn-cs"/>
+          <a:latin typeface="+mj-lt"/>
+          <a:ea typeface="+mj-ea"/>
+          <a:cs typeface="+mj-cs"/>
           <a:sym typeface="Helvetica Neue"/>
         </a:defRPr>
       </a:lvl2pPr>
-      <a:lvl3pPr marL="0" marR="0" indent="914400" algn="l" defTabSz="2438338" rtl="0" latinLnBrk="0">
+      <a:lvl3pPr marL="0" marR="0" indent="0" algn="l" defTabSz="2438337" rtl="0" latinLnBrk="0">
         <a:lnSpc>
           <a:spcPct val="80000"/>
         </a:lnSpc>
@@ -3166,13 +3270,13 @@
             <a:srgbClr val="000000"/>
           </a:solidFill>
           <a:uFillTx/>
-          <a:latin typeface="+mn-lt"/>
-          <a:ea typeface="+mn-ea"/>
-          <a:cs typeface="+mn-cs"/>
+          <a:latin typeface="+mj-lt"/>
+          <a:ea typeface="+mj-ea"/>
+          <a:cs typeface="+mj-cs"/>
           <a:sym typeface="Helvetica Neue"/>
         </a:defRPr>
       </a:lvl3pPr>
-      <a:lvl4pPr marL="0" marR="0" indent="1371600" algn="l" defTabSz="2438338" rtl="0" latinLnBrk="0">
+      <a:lvl4pPr marL="0" marR="0" indent="0" algn="l" defTabSz="2438337" rtl="0" latinLnBrk="0">
         <a:lnSpc>
           <a:spcPct val="80000"/>
         </a:lnSpc>
@@ -3192,13 +3296,13 @@
             <a:srgbClr val="000000"/>
           </a:solidFill>
           <a:uFillTx/>
-          <a:latin typeface="+mn-lt"/>
-          <a:ea typeface="+mn-ea"/>
-          <a:cs typeface="+mn-cs"/>
+          <a:latin typeface="+mj-lt"/>
+          <a:ea typeface="+mj-ea"/>
+          <a:cs typeface="+mj-cs"/>
           <a:sym typeface="Helvetica Neue"/>
         </a:defRPr>
       </a:lvl4pPr>
-      <a:lvl5pPr marL="0" marR="0" indent="1828800" algn="l" defTabSz="2438338" rtl="0" latinLnBrk="0">
+      <a:lvl5pPr marL="0" marR="0" indent="0" algn="l" defTabSz="2438337" rtl="0" latinLnBrk="0">
         <a:lnSpc>
           <a:spcPct val="80000"/>
         </a:lnSpc>
@@ -3218,13 +3322,13 @@
             <a:srgbClr val="000000"/>
           </a:solidFill>
           <a:uFillTx/>
-          <a:latin typeface="+mn-lt"/>
-          <a:ea typeface="+mn-ea"/>
-          <a:cs typeface="+mn-cs"/>
+          <a:latin typeface="+mj-lt"/>
+          <a:ea typeface="+mj-ea"/>
+          <a:cs typeface="+mj-cs"/>
           <a:sym typeface="Helvetica Neue"/>
         </a:defRPr>
       </a:lvl5pPr>
-      <a:lvl6pPr marL="0" marR="0" indent="2286000" algn="l" defTabSz="2438338" rtl="0" latinLnBrk="0">
+      <a:lvl6pPr marL="0" marR="0" indent="0" algn="l" defTabSz="2438337" rtl="0" latinLnBrk="0">
         <a:lnSpc>
           <a:spcPct val="80000"/>
         </a:lnSpc>
@@ -3244,13 +3348,13 @@
             <a:srgbClr val="000000"/>
           </a:solidFill>
           <a:uFillTx/>
-          <a:latin typeface="+mn-lt"/>
-          <a:ea typeface="+mn-ea"/>
-          <a:cs typeface="+mn-cs"/>
+          <a:latin typeface="+mj-lt"/>
+          <a:ea typeface="+mj-ea"/>
+          <a:cs typeface="+mj-cs"/>
           <a:sym typeface="Helvetica Neue"/>
         </a:defRPr>
       </a:lvl6pPr>
-      <a:lvl7pPr marL="0" marR="0" indent="2743200" algn="l" defTabSz="2438338" rtl="0" latinLnBrk="0">
+      <a:lvl7pPr marL="0" marR="0" indent="0" algn="l" defTabSz="2438337" rtl="0" latinLnBrk="0">
         <a:lnSpc>
           <a:spcPct val="80000"/>
         </a:lnSpc>
@@ -3270,13 +3374,13 @@
             <a:srgbClr val="000000"/>
           </a:solidFill>
           <a:uFillTx/>
-          <a:latin typeface="+mn-lt"/>
-          <a:ea typeface="+mn-ea"/>
-          <a:cs typeface="+mn-cs"/>
+          <a:latin typeface="+mj-lt"/>
+          <a:ea typeface="+mj-ea"/>
+          <a:cs typeface="+mj-cs"/>
           <a:sym typeface="Helvetica Neue"/>
         </a:defRPr>
       </a:lvl7pPr>
-      <a:lvl8pPr marL="0" marR="0" indent="3200400" algn="l" defTabSz="2438338" rtl="0" latinLnBrk="0">
+      <a:lvl8pPr marL="0" marR="0" indent="0" algn="l" defTabSz="2438337" rtl="0" latinLnBrk="0">
         <a:lnSpc>
           <a:spcPct val="80000"/>
         </a:lnSpc>
@@ -3296,13 +3400,13 @@
             <a:srgbClr val="000000"/>
           </a:solidFill>
           <a:uFillTx/>
-          <a:latin typeface="+mn-lt"/>
-          <a:ea typeface="+mn-ea"/>
-          <a:cs typeface="+mn-cs"/>
+          <a:latin typeface="+mj-lt"/>
+          <a:ea typeface="+mj-ea"/>
+          <a:cs typeface="+mj-cs"/>
           <a:sym typeface="Helvetica Neue"/>
         </a:defRPr>
       </a:lvl8pPr>
-      <a:lvl9pPr marL="0" marR="0" indent="3657600" algn="l" defTabSz="2438338" rtl="0" latinLnBrk="0">
+      <a:lvl9pPr marL="0" marR="0" indent="0" algn="l" defTabSz="2438337" rtl="0" latinLnBrk="0">
         <a:lnSpc>
           <a:spcPct val="80000"/>
         </a:lnSpc>
@@ -3322,15 +3426,15 @@
             <a:srgbClr val="000000"/>
           </a:solidFill>
           <a:uFillTx/>
-          <a:latin typeface="+mn-lt"/>
-          <a:ea typeface="+mn-ea"/>
-          <a:cs typeface="+mn-cs"/>
+          <a:latin typeface="+mj-lt"/>
+          <a:ea typeface="+mj-ea"/>
+          <a:cs typeface="+mj-cs"/>
           <a:sym typeface="Helvetica Neue"/>
         </a:defRPr>
       </a:lvl9pPr>
     </p:titleStyle>
     <p:bodyStyle>
-      <a:lvl1pPr marL="609600" marR="0" indent="-609600" algn="l" defTabSz="2438338" rtl="0" latinLnBrk="0">
+      <a:lvl1pPr marL="609600" marR="0" indent="-609600" algn="l" defTabSz="2438337" rtl="0" latinLnBrk="0">
         <a:lnSpc>
           <a:spcPct val="90000"/>
         </a:lnSpc>
@@ -3350,13 +3454,13 @@
             <a:srgbClr val="000000"/>
           </a:solidFill>
           <a:uFillTx/>
-          <a:latin typeface="+mn-lt"/>
-          <a:ea typeface="+mn-ea"/>
-          <a:cs typeface="+mn-cs"/>
+          <a:latin typeface="+mj-lt"/>
+          <a:ea typeface="+mj-ea"/>
+          <a:cs typeface="+mj-cs"/>
           <a:sym typeface="Helvetica Neue"/>
         </a:defRPr>
       </a:lvl1pPr>
-      <a:lvl2pPr marL="1219200" marR="0" indent="-609600" algn="l" defTabSz="2438338" rtl="0" latinLnBrk="0">
+      <a:lvl2pPr marL="1219200" marR="0" indent="-609600" algn="l" defTabSz="2438337" rtl="0" latinLnBrk="0">
         <a:lnSpc>
           <a:spcPct val="90000"/>
         </a:lnSpc>
@@ -3376,13 +3480,13 @@
             <a:srgbClr val="000000"/>
           </a:solidFill>
           <a:uFillTx/>
-          <a:latin typeface="+mn-lt"/>
-          <a:ea typeface="+mn-ea"/>
-          <a:cs typeface="+mn-cs"/>
+          <a:latin typeface="+mj-lt"/>
+          <a:ea typeface="+mj-ea"/>
+          <a:cs typeface="+mj-cs"/>
           <a:sym typeface="Helvetica Neue"/>
         </a:defRPr>
       </a:lvl2pPr>
-      <a:lvl3pPr marL="1828800" marR="0" indent="-609600" algn="l" defTabSz="2438338" rtl="0" latinLnBrk="0">
+      <a:lvl3pPr marL="1828800" marR="0" indent="-609600" algn="l" defTabSz="2438337" rtl="0" latinLnBrk="0">
         <a:lnSpc>
           <a:spcPct val="90000"/>
         </a:lnSpc>
@@ -3402,13 +3506,13 @@
             <a:srgbClr val="000000"/>
           </a:solidFill>
           <a:uFillTx/>
-          <a:latin typeface="+mn-lt"/>
-          <a:ea typeface="+mn-ea"/>
-          <a:cs typeface="+mn-cs"/>
+          <a:latin typeface="+mj-lt"/>
+          <a:ea typeface="+mj-ea"/>
+          <a:cs typeface="+mj-cs"/>
           <a:sym typeface="Helvetica Neue"/>
         </a:defRPr>
       </a:lvl3pPr>
-      <a:lvl4pPr marL="2438400" marR="0" indent="-609600" algn="l" defTabSz="2438338" rtl="0" latinLnBrk="0">
+      <a:lvl4pPr marL="2438400" marR="0" indent="-609600" algn="l" defTabSz="2438337" rtl="0" latinLnBrk="0">
         <a:lnSpc>
           <a:spcPct val="90000"/>
         </a:lnSpc>
@@ -3428,13 +3532,13 @@
             <a:srgbClr val="000000"/>
           </a:solidFill>
           <a:uFillTx/>
-          <a:latin typeface="+mn-lt"/>
-          <a:ea typeface="+mn-ea"/>
-          <a:cs typeface="+mn-cs"/>
+          <a:latin typeface="+mj-lt"/>
+          <a:ea typeface="+mj-ea"/>
+          <a:cs typeface="+mj-cs"/>
           <a:sym typeface="Helvetica Neue"/>
         </a:defRPr>
       </a:lvl4pPr>
-      <a:lvl5pPr marL="3048000" marR="0" indent="-609600" algn="l" defTabSz="2438338" rtl="0" latinLnBrk="0">
+      <a:lvl5pPr marL="3048000" marR="0" indent="-609600" algn="l" defTabSz="2438337" rtl="0" latinLnBrk="0">
         <a:lnSpc>
           <a:spcPct val="90000"/>
         </a:lnSpc>
@@ -3454,13 +3558,13 @@
             <a:srgbClr val="000000"/>
           </a:solidFill>
           <a:uFillTx/>
-          <a:latin typeface="+mn-lt"/>
-          <a:ea typeface="+mn-ea"/>
-          <a:cs typeface="+mn-cs"/>
+          <a:latin typeface="+mj-lt"/>
+          <a:ea typeface="+mj-ea"/>
+          <a:cs typeface="+mj-cs"/>
           <a:sym typeface="Helvetica Neue"/>
         </a:defRPr>
       </a:lvl5pPr>
-      <a:lvl6pPr marL="3657600" marR="0" indent="-609600" algn="l" defTabSz="2438338" rtl="0" latinLnBrk="0">
+      <a:lvl6pPr marL="3657600" marR="0" indent="-609600" algn="l" defTabSz="2438337" rtl="0" latinLnBrk="0">
         <a:lnSpc>
           <a:spcPct val="90000"/>
         </a:lnSpc>
@@ -3480,13 +3584,13 @@
             <a:srgbClr val="000000"/>
           </a:solidFill>
           <a:uFillTx/>
-          <a:latin typeface="+mn-lt"/>
-          <a:ea typeface="+mn-ea"/>
-          <a:cs typeface="+mn-cs"/>
+          <a:latin typeface="+mj-lt"/>
+          <a:ea typeface="+mj-ea"/>
+          <a:cs typeface="+mj-cs"/>
           <a:sym typeface="Helvetica Neue"/>
         </a:defRPr>
       </a:lvl6pPr>
-      <a:lvl7pPr marL="4267200" marR="0" indent="-609600" algn="l" defTabSz="2438338" rtl="0" latinLnBrk="0">
+      <a:lvl7pPr marL="4267200" marR="0" indent="-609600" algn="l" defTabSz="2438337" rtl="0" latinLnBrk="0">
         <a:lnSpc>
           <a:spcPct val="90000"/>
         </a:lnSpc>
@@ -3506,13 +3610,13 @@
             <a:srgbClr val="000000"/>
           </a:solidFill>
           <a:uFillTx/>
-          <a:latin typeface="+mn-lt"/>
-          <a:ea typeface="+mn-ea"/>
-          <a:cs typeface="+mn-cs"/>
+          <a:latin typeface="+mj-lt"/>
+          <a:ea typeface="+mj-ea"/>
+          <a:cs typeface="+mj-cs"/>
           <a:sym typeface="Helvetica Neue"/>
         </a:defRPr>
       </a:lvl7pPr>
-      <a:lvl8pPr marL="4876800" marR="0" indent="-609600" algn="l" defTabSz="2438338" rtl="0" latinLnBrk="0">
+      <a:lvl8pPr marL="4876800" marR="0" indent="-609600" algn="l" defTabSz="2438337" rtl="0" latinLnBrk="0">
         <a:lnSpc>
           <a:spcPct val="90000"/>
         </a:lnSpc>
@@ -3532,13 +3636,13 @@
             <a:srgbClr val="000000"/>
           </a:solidFill>
           <a:uFillTx/>
-          <a:latin typeface="+mn-lt"/>
-          <a:ea typeface="+mn-ea"/>
-          <a:cs typeface="+mn-cs"/>
+          <a:latin typeface="+mj-lt"/>
+          <a:ea typeface="+mj-ea"/>
+          <a:cs typeface="+mj-cs"/>
           <a:sym typeface="Helvetica Neue"/>
         </a:defRPr>
       </a:lvl8pPr>
-      <a:lvl9pPr marL="5486400" marR="0" indent="-609600" algn="l" defTabSz="2438338" rtl="0" latinLnBrk="0">
+      <a:lvl9pPr marL="5486400" marR="0" indent="-609600" algn="l" defTabSz="2438337" rtl="0" latinLnBrk="0">
         <a:lnSpc>
           <a:spcPct val="90000"/>
         </a:lnSpc>
@@ -3558,9 +3662,9 @@
             <a:srgbClr val="000000"/>
           </a:solidFill>
           <a:uFillTx/>
-          <a:latin typeface="+mn-lt"/>
-          <a:ea typeface="+mn-ea"/>
-          <a:cs typeface="+mn-cs"/>
+          <a:latin typeface="+mj-lt"/>
+          <a:ea typeface="+mj-ea"/>
+          <a:cs typeface="+mj-cs"/>
           <a:sym typeface="Helvetica Neue"/>
         </a:defRPr>
       </a:lvl9pPr>
@@ -3592,7 +3696,7 @@
           <a:sym typeface="Helvetica Neue"/>
         </a:defRPr>
       </a:lvl1pPr>
-      <a:lvl2pPr marL="0" marR="0" indent="457200" algn="ctr" defTabSz="584200" rtl="0" latinLnBrk="0">
+      <a:lvl2pPr marL="0" marR="0" indent="0" algn="ctr" defTabSz="584200" rtl="0" latinLnBrk="0">
         <a:lnSpc>
           <a:spcPct val="100000"/>
         </a:lnSpc>
@@ -3618,7 +3722,7 @@
           <a:sym typeface="Helvetica Neue"/>
         </a:defRPr>
       </a:lvl2pPr>
-      <a:lvl3pPr marL="0" marR="0" indent="914400" algn="ctr" defTabSz="584200" rtl="0" latinLnBrk="0">
+      <a:lvl3pPr marL="0" marR="0" indent="0" algn="ctr" defTabSz="584200" rtl="0" latinLnBrk="0">
         <a:lnSpc>
           <a:spcPct val="100000"/>
         </a:lnSpc>
@@ -3644,7 +3748,7 @@
           <a:sym typeface="Helvetica Neue"/>
         </a:defRPr>
       </a:lvl3pPr>
-      <a:lvl4pPr marL="0" marR="0" indent="1371600" algn="ctr" defTabSz="584200" rtl="0" latinLnBrk="0">
+      <a:lvl4pPr marL="0" marR="0" indent="0" algn="ctr" defTabSz="584200" rtl="0" latinLnBrk="0">
         <a:lnSpc>
           <a:spcPct val="100000"/>
         </a:lnSpc>
@@ -3670,7 +3774,7 @@
           <a:sym typeface="Helvetica Neue"/>
         </a:defRPr>
       </a:lvl4pPr>
-      <a:lvl5pPr marL="0" marR="0" indent="1828800" algn="ctr" defTabSz="584200" rtl="0" latinLnBrk="0">
+      <a:lvl5pPr marL="0" marR="0" indent="0" algn="ctr" defTabSz="584200" rtl="0" latinLnBrk="0">
         <a:lnSpc>
           <a:spcPct val="100000"/>
         </a:lnSpc>
@@ -3696,7 +3800,7 @@
           <a:sym typeface="Helvetica Neue"/>
         </a:defRPr>
       </a:lvl5pPr>
-      <a:lvl6pPr marL="0" marR="0" indent="2286000" algn="ctr" defTabSz="584200" rtl="0" latinLnBrk="0">
+      <a:lvl6pPr marL="0" marR="0" indent="0" algn="ctr" defTabSz="584200" rtl="0" latinLnBrk="0">
         <a:lnSpc>
           <a:spcPct val="100000"/>
         </a:lnSpc>
@@ -3722,7 +3826,7 @@
           <a:sym typeface="Helvetica Neue"/>
         </a:defRPr>
       </a:lvl6pPr>
-      <a:lvl7pPr marL="0" marR="0" indent="2743200" algn="ctr" defTabSz="584200" rtl="0" latinLnBrk="0">
+      <a:lvl7pPr marL="0" marR="0" indent="0" algn="ctr" defTabSz="584200" rtl="0" latinLnBrk="0">
         <a:lnSpc>
           <a:spcPct val="100000"/>
         </a:lnSpc>
@@ -3748,7 +3852,7 @@
           <a:sym typeface="Helvetica Neue"/>
         </a:defRPr>
       </a:lvl7pPr>
-      <a:lvl8pPr marL="0" marR="0" indent="3200400" algn="ctr" defTabSz="584200" rtl="0" latinLnBrk="0">
+      <a:lvl8pPr marL="0" marR="0" indent="0" algn="ctr" defTabSz="584200" rtl="0" latinLnBrk="0">
         <a:lnSpc>
           <a:spcPct val="100000"/>
         </a:lnSpc>
@@ -3774,7 +3878,7 @@
           <a:sym typeface="Helvetica Neue"/>
         </a:defRPr>
       </a:lvl8pPr>
-      <a:lvl9pPr marL="0" marR="0" indent="3657600" algn="ctr" defTabSz="584200" rtl="0" latinLnBrk="0">
+      <a:lvl9pPr marL="0" marR="0" indent="0" algn="ctr" defTabSz="584200" rtl="0" latinLnBrk="0">
         <a:lnSpc>
           <a:spcPct val="100000"/>
         </a:lnSpc>
@@ -3822,183 +3926,363 @@
           <a:chExt cx="0" cy="0"/>
         </a:xfrm>
       </p:grpSpPr>
+      <p:grpSp>
+        <p:nvGrpSpPr>
+          <p:cNvPr id="153" name="model server"/>
+          <p:cNvGrpSpPr/>
+          <p:nvPr/>
+        </p:nvGrpSpPr>
+        <p:grpSpPr>
+          <a:xfrm>
+            <a:off x="7568185" y="5819369"/>
+            <a:ext cx="1930539" cy="1600734"/>
+            <a:chOff x="0" y="0"/>
+            <a:chExt cx="1930537" cy="1600732"/>
+          </a:xfrm>
+        </p:grpSpPr>
+        <p:sp>
+          <p:nvSpPr>
+            <p:cNvPr id="151" name="Rectangle"/>
+            <p:cNvSpPr/>
+            <p:nvPr/>
+          </p:nvSpPr>
+          <p:spPr>
+            <a:xfrm>
+              <a:off x="0" y="-1"/>
+              <a:ext cx="1930538" cy="1600734"/>
+            </a:xfrm>
+            <a:prstGeom prst="rect">
+              <a:avLst/>
+            </a:prstGeom>
+            <a:solidFill>
+              <a:srgbClr val="FFFFFF"/>
+            </a:solidFill>
+            <a:ln w="12700" cap="flat">
+              <a:solidFill>
+                <a:srgbClr val="000000"/>
+              </a:solidFill>
+              <a:prstDash val="solid"/>
+              <a:miter lim="400000"/>
+            </a:ln>
+            <a:effectLst/>
+          </p:spPr>
+          <p:txBody>
+            <a:bodyPr wrap="square" lIns="50800" tIns="50800" rIns="50800" bIns="50800" numCol="1" anchor="ctr">
+              <a:noAutofit/>
+            </a:bodyPr>
+            <a:lstStyle/>
+            <a:p>
+              <a:pPr defTabSz="825500">
+                <a:defRPr sz="3200">
+                  <a:solidFill>
+                    <a:srgbClr val="000000"/>
+                  </a:solidFill>
+                  <a:latin typeface="Helvetica Neue Medium"/>
+                  <a:ea typeface="Helvetica Neue Medium"/>
+                  <a:cs typeface="Helvetica Neue Medium"/>
+                  <a:sym typeface="Helvetica Neue Medium"/>
+                </a:defRPr>
+              </a:pPr>
+            </a:p>
+          </p:txBody>
+        </p:sp>
+        <p:sp>
+          <p:nvSpPr>
+            <p:cNvPr id="152" name="model server"/>
+            <p:cNvSpPr txBox="1"/>
+            <p:nvPr/>
+          </p:nvSpPr>
+          <p:spPr>
+            <a:xfrm>
+              <a:off x="6350" y="260160"/>
+              <a:ext cx="1917838" cy="1080412"/>
+            </a:xfrm>
+            <a:prstGeom prst="rect">
+              <a:avLst/>
+            </a:prstGeom>
+            <a:noFill/>
+            <a:ln w="12700" cap="flat">
+              <a:noFill/>
+              <a:miter lim="400000"/>
+            </a:ln>
+            <a:effectLst/>
+            <a:extLst>
+              <a:ext uri="{C572A759-6A51-4108-AA02-DFA0A04FC94B}">
+                <ma14:wrappingTextBoxFlag xmlns:ma14="http://schemas.microsoft.com/office/mac/drawingml/2011/main" val="1"/>
+              </a:ext>
+            </a:extLst>
+          </p:spPr>
+          <p:txBody>
+            <a:bodyPr wrap="square" lIns="50800" tIns="50800" rIns="50800" bIns="50800" numCol="1" anchor="ctr">
+              <a:spAutoFit/>
+            </a:bodyPr>
+            <a:lstStyle>
+              <a:lvl1pPr defTabSz="825500">
+                <a:defRPr sz="3200">
+                  <a:solidFill>
+                    <a:srgbClr val="000000"/>
+                  </a:solidFill>
+                  <a:latin typeface="Helvetica Neue Medium"/>
+                  <a:ea typeface="Helvetica Neue Medium"/>
+                  <a:cs typeface="Helvetica Neue Medium"/>
+                  <a:sym typeface="Helvetica Neue Medium"/>
+                </a:defRPr>
+              </a:lvl1pPr>
+            </a:lstStyle>
+            <a:p>
+              <a:pPr/>
+              <a:r>
+                <a:t>model server</a:t>
+              </a:r>
+            </a:p>
+          </p:txBody>
+        </p:sp>
+      </p:grpSp>
+      <p:grpSp>
+        <p:nvGrpSpPr>
+          <p:cNvPr id="156" name="web server"/>
+          <p:cNvGrpSpPr/>
+          <p:nvPr/>
+        </p:nvGrpSpPr>
+        <p:grpSpPr>
+          <a:xfrm>
+            <a:off x="11351597" y="3517417"/>
+            <a:ext cx="1930538" cy="1600734"/>
+            <a:chOff x="0" y="0"/>
+            <a:chExt cx="1930537" cy="1600733"/>
+          </a:xfrm>
+        </p:grpSpPr>
+        <p:sp>
+          <p:nvSpPr>
+            <p:cNvPr id="154" name="Rectangle"/>
+            <p:cNvSpPr/>
+            <p:nvPr/>
+          </p:nvSpPr>
+          <p:spPr>
+            <a:xfrm>
+              <a:off x="-1" y="-1"/>
+              <a:ext cx="1930539" cy="1600735"/>
+            </a:xfrm>
+            <a:prstGeom prst="rect">
+              <a:avLst/>
+            </a:prstGeom>
+            <a:solidFill>
+              <a:srgbClr val="FFFFFF"/>
+            </a:solidFill>
+            <a:ln w="12700" cap="flat">
+              <a:solidFill>
+                <a:srgbClr val="000000"/>
+              </a:solidFill>
+              <a:prstDash val="solid"/>
+              <a:miter lim="400000"/>
+            </a:ln>
+            <a:effectLst/>
+          </p:spPr>
+          <p:txBody>
+            <a:bodyPr wrap="square" lIns="50800" tIns="50800" rIns="50800" bIns="50800" numCol="1" anchor="ctr">
+              <a:noAutofit/>
+            </a:bodyPr>
+            <a:lstStyle/>
+            <a:p>
+              <a:pPr defTabSz="825500">
+                <a:defRPr sz="3200">
+                  <a:solidFill>
+                    <a:srgbClr val="000000"/>
+                  </a:solidFill>
+                  <a:latin typeface="Helvetica Neue Medium"/>
+                  <a:ea typeface="Helvetica Neue Medium"/>
+                  <a:cs typeface="Helvetica Neue Medium"/>
+                  <a:sym typeface="Helvetica Neue Medium"/>
+                </a:defRPr>
+              </a:pPr>
+            </a:p>
+          </p:txBody>
+        </p:sp>
+        <p:sp>
+          <p:nvSpPr>
+            <p:cNvPr id="155" name="web server"/>
+            <p:cNvSpPr txBox="1"/>
+            <p:nvPr/>
+          </p:nvSpPr>
+          <p:spPr>
+            <a:xfrm>
+              <a:off x="6349" y="260160"/>
+              <a:ext cx="1917839" cy="1080413"/>
+            </a:xfrm>
+            <a:prstGeom prst="rect">
+              <a:avLst/>
+            </a:prstGeom>
+            <a:noFill/>
+            <a:ln w="12700" cap="flat">
+              <a:noFill/>
+              <a:miter lim="400000"/>
+            </a:ln>
+            <a:effectLst/>
+            <a:extLst>
+              <a:ext uri="{C572A759-6A51-4108-AA02-DFA0A04FC94B}">
+                <ma14:wrappingTextBoxFlag xmlns:ma14="http://schemas.microsoft.com/office/mac/drawingml/2011/main" val="1"/>
+              </a:ext>
+            </a:extLst>
+          </p:spPr>
+          <p:txBody>
+            <a:bodyPr wrap="square" lIns="50800" tIns="50800" rIns="50800" bIns="50800" numCol="1" anchor="ctr">
+              <a:spAutoFit/>
+            </a:bodyPr>
+            <a:lstStyle>
+              <a:lvl1pPr defTabSz="825500">
+                <a:defRPr sz="3200">
+                  <a:solidFill>
+                    <a:srgbClr val="000000"/>
+                  </a:solidFill>
+                  <a:latin typeface="Helvetica Neue Medium"/>
+                  <a:ea typeface="Helvetica Neue Medium"/>
+                  <a:cs typeface="Helvetica Neue Medium"/>
+                  <a:sym typeface="Helvetica Neue Medium"/>
+                </a:defRPr>
+              </a:lvl1pPr>
+            </a:lstStyle>
+            <a:p>
+              <a:pPr/>
+              <a:r>
+                <a:t>web server</a:t>
+              </a:r>
+            </a:p>
+          </p:txBody>
+        </p:sp>
+      </p:grpSp>
+      <p:grpSp>
+        <p:nvGrpSpPr>
+          <p:cNvPr id="159" name="Dev &amp; train…"/>
+          <p:cNvGrpSpPr/>
+          <p:nvPr/>
+        </p:nvGrpSpPr>
+        <p:grpSpPr>
+          <a:xfrm>
+            <a:off x="3385794" y="5356614"/>
+            <a:ext cx="2576142" cy="2526245"/>
+            <a:chOff x="0" y="0"/>
+            <a:chExt cx="2576141" cy="2526244"/>
+          </a:xfrm>
+        </p:grpSpPr>
+        <p:sp>
+          <p:nvSpPr>
+            <p:cNvPr id="157" name="Rectangle"/>
+            <p:cNvSpPr/>
+            <p:nvPr/>
+          </p:nvSpPr>
+          <p:spPr>
+            <a:xfrm>
+              <a:off x="-1" y="-1"/>
+              <a:ext cx="2576143" cy="2526246"/>
+            </a:xfrm>
+            <a:prstGeom prst="rect">
+              <a:avLst/>
+            </a:prstGeom>
+            <a:solidFill>
+              <a:srgbClr val="FFFFFF"/>
+            </a:solidFill>
+            <a:ln w="12700" cap="flat">
+              <a:noFill/>
+              <a:miter lim="400000"/>
+            </a:ln>
+            <a:effectLst/>
+          </p:spPr>
+          <p:txBody>
+            <a:bodyPr wrap="square" lIns="50800" tIns="50800" rIns="50800" bIns="50800" numCol="1" anchor="ctr">
+              <a:noAutofit/>
+            </a:bodyPr>
+            <a:lstStyle/>
+            <a:p>
+              <a:pPr defTabSz="825500">
+                <a:defRPr sz="3200">
+                  <a:solidFill>
+                    <a:srgbClr val="000000"/>
+                  </a:solidFill>
+                  <a:latin typeface="Helvetica Neue Medium"/>
+                  <a:ea typeface="Helvetica Neue Medium"/>
+                  <a:cs typeface="Helvetica Neue Medium"/>
+                  <a:sym typeface="Helvetica Neue Medium"/>
+                </a:defRPr>
+              </a:pPr>
+            </a:p>
+          </p:txBody>
+        </p:sp>
+        <p:sp>
+          <p:nvSpPr>
+            <p:cNvPr id="158" name="Dev &amp; train…"/>
+            <p:cNvSpPr txBox="1"/>
+            <p:nvPr/>
+          </p:nvSpPr>
+          <p:spPr>
+            <a:xfrm>
+              <a:off x="-1" y="722916"/>
+              <a:ext cx="2576143" cy="1080412"/>
+            </a:xfrm>
+            <a:prstGeom prst="rect">
+              <a:avLst/>
+            </a:prstGeom>
+            <a:noFill/>
+            <a:ln w="12700" cap="flat">
+              <a:noFill/>
+              <a:miter lim="400000"/>
+            </a:ln>
+            <a:effectLst/>
+            <a:extLst>
+              <a:ext uri="{C572A759-6A51-4108-AA02-DFA0A04FC94B}">
+                <ma14:wrappingTextBoxFlag xmlns:ma14="http://schemas.microsoft.com/office/mac/drawingml/2011/main" val="1"/>
+              </a:ext>
+            </a:extLst>
+          </p:spPr>
+          <p:txBody>
+            <a:bodyPr wrap="square" lIns="50800" tIns="50800" rIns="50800" bIns="50800" numCol="1" anchor="ctr">
+              <a:spAutoFit/>
+            </a:bodyPr>
+            <a:lstStyle/>
+            <a:p>
+              <a:pPr defTabSz="825500">
+                <a:defRPr sz="3200">
+                  <a:solidFill>
+                    <a:srgbClr val="000000"/>
+                  </a:solidFill>
+                  <a:latin typeface="Helvetica Neue Medium"/>
+                  <a:ea typeface="Helvetica Neue Medium"/>
+                  <a:cs typeface="Helvetica Neue Medium"/>
+                  <a:sym typeface="Helvetica Neue Medium"/>
+                </a:defRPr>
+              </a:pPr>
+              <a:r>
+                <a:t>Dev &amp; train</a:t>
+              </a:r>
+            </a:p>
+            <a:p>
+              <a:pPr defTabSz="825500">
+                <a:defRPr sz="3200">
+                  <a:solidFill>
+                    <a:srgbClr val="000000"/>
+                  </a:solidFill>
+                  <a:latin typeface="Helvetica Neue Medium"/>
+                  <a:ea typeface="Helvetica Neue Medium"/>
+                  <a:cs typeface="Helvetica Neue Medium"/>
+                  <a:sym typeface="Helvetica Neue Medium"/>
+                </a:defRPr>
+              </a:pPr>
+              <a:r>
+                <a:t>environment</a:t>
+              </a:r>
+            </a:p>
+          </p:txBody>
+        </p:sp>
+      </p:grpSp>
       <p:sp>
         <p:nvSpPr>
-          <p:cNvPr id="151" name="model server"/>
+          <p:cNvPr id="160" name="Line"/>
           <p:cNvSpPr/>
           <p:nvPr/>
         </p:nvSpPr>
         <p:spPr>
           <a:xfrm>
-            <a:off x="7568185" y="5819370"/>
-            <a:ext cx="1930538" cy="1600732"/>
-          </a:xfrm>
-          <a:prstGeom prst="rect">
-            <a:avLst/>
-          </a:prstGeom>
-          <a:solidFill>
-            <a:srgbClr val="FFFFFF"/>
-          </a:solidFill>
-          <a:ln w="12700">
-            <a:solidFill>
-              <a:srgbClr val="000000"/>
-            </a:solidFill>
-            <a:miter lim="400000"/>
-          </a:ln>
-          <a:extLst>
-            <a:ext uri="{C572A759-6A51-4108-AA02-DFA0A04FC94B}">
-              <ma14:wrappingTextBoxFlag xmlns:ma14="http://schemas.microsoft.com/office/mac/drawingml/2011/main" val="1"/>
-            </a:ext>
-          </a:extLst>
-        </p:spPr>
-        <p:txBody>
-          <a:bodyPr lIns="50800" tIns="50800" rIns="50800" bIns="50800" anchor="ctr"/>
-          <a:lstStyle>
-            <a:lvl1pPr defTabSz="825500">
-              <a:defRPr sz="3200">
-                <a:solidFill>
-                  <a:srgbClr val="000000"/>
-                </a:solidFill>
-                <a:latin typeface="Helvetica Neue Medium"/>
-                <a:ea typeface="Helvetica Neue Medium"/>
-                <a:cs typeface="Helvetica Neue Medium"/>
-                <a:sym typeface="Helvetica Neue Medium"/>
-              </a:defRPr>
-            </a:lvl1pPr>
-          </a:lstStyle>
-          <a:p>
-            <a:pPr/>
-            <a:r>
-              <a:t>model server</a:t>
-            </a:r>
-          </a:p>
-        </p:txBody>
-      </p:sp>
-      <p:sp>
-        <p:nvSpPr>
-          <p:cNvPr id="152" name="web server"/>
-          <p:cNvSpPr/>
-          <p:nvPr/>
-        </p:nvSpPr>
-        <p:spPr>
-          <a:xfrm>
-            <a:off x="11351598" y="3136417"/>
-            <a:ext cx="1930537" cy="1600733"/>
-          </a:xfrm>
-          <a:prstGeom prst="rect">
-            <a:avLst/>
-          </a:prstGeom>
-          <a:solidFill>
-            <a:srgbClr val="FFFFFF"/>
-          </a:solidFill>
-          <a:ln w="12700">
-            <a:solidFill>
-              <a:srgbClr val="000000"/>
-            </a:solidFill>
-            <a:miter lim="400000"/>
-          </a:ln>
-          <a:extLst>
-            <a:ext uri="{C572A759-6A51-4108-AA02-DFA0A04FC94B}">
-              <ma14:wrappingTextBoxFlag xmlns:ma14="http://schemas.microsoft.com/office/mac/drawingml/2011/main" val="1"/>
-            </a:ext>
-          </a:extLst>
-        </p:spPr>
-        <p:txBody>
-          <a:bodyPr lIns="50800" tIns="50800" rIns="50800" bIns="50800" anchor="ctr"/>
-          <a:lstStyle>
-            <a:lvl1pPr defTabSz="825500">
-              <a:defRPr sz="3200">
-                <a:solidFill>
-                  <a:srgbClr val="000000"/>
-                </a:solidFill>
-                <a:latin typeface="Helvetica Neue Medium"/>
-                <a:ea typeface="Helvetica Neue Medium"/>
-                <a:cs typeface="Helvetica Neue Medium"/>
-                <a:sym typeface="Helvetica Neue Medium"/>
-              </a:defRPr>
-            </a:lvl1pPr>
-          </a:lstStyle>
-          <a:p>
-            <a:pPr/>
-            <a:r>
-              <a:t>web server</a:t>
-            </a:r>
-          </a:p>
-        </p:txBody>
-      </p:sp>
-      <p:sp>
-        <p:nvSpPr>
-          <p:cNvPr id="153" name="Dev &amp; train…"/>
-          <p:cNvSpPr/>
-          <p:nvPr/>
-        </p:nvSpPr>
-        <p:spPr>
-          <a:xfrm>
-            <a:off x="3385795" y="5356614"/>
-            <a:ext cx="2576141" cy="2526244"/>
-          </a:xfrm>
-          <a:prstGeom prst="rect">
-            <a:avLst/>
-          </a:prstGeom>
-          <a:solidFill>
-            <a:srgbClr val="FFFFFF"/>
-          </a:solidFill>
-          <a:ln w="12700">
-            <a:miter lim="400000"/>
-          </a:ln>
-          <a:extLst>
-            <a:ext uri="{C572A759-6A51-4108-AA02-DFA0A04FC94B}">
-              <ma14:wrappingTextBoxFlag xmlns:ma14="http://schemas.microsoft.com/office/mac/drawingml/2011/main" val="1"/>
-            </a:ext>
-          </a:extLst>
-        </p:spPr>
-        <p:txBody>
-          <a:bodyPr lIns="50800" tIns="50800" rIns="50800" bIns="50800" anchor="ctr"/>
-          <a:lstStyle/>
-          <a:p>
-            <a:pPr defTabSz="825500">
-              <a:defRPr sz="3200">
-                <a:solidFill>
-                  <a:srgbClr val="000000"/>
-                </a:solidFill>
-                <a:latin typeface="Helvetica Neue Medium"/>
-                <a:ea typeface="Helvetica Neue Medium"/>
-                <a:cs typeface="Helvetica Neue Medium"/>
-                <a:sym typeface="Helvetica Neue Medium"/>
-              </a:defRPr>
-            </a:pPr>
-            <a:r>
-              <a:t>Dev &amp; train</a:t>
-            </a:r>
-          </a:p>
-          <a:p>
-            <a:pPr defTabSz="825500">
-              <a:defRPr sz="3200">
-                <a:solidFill>
-                  <a:srgbClr val="000000"/>
-                </a:solidFill>
-                <a:latin typeface="Helvetica Neue Medium"/>
-                <a:ea typeface="Helvetica Neue Medium"/>
-                <a:cs typeface="Helvetica Neue Medium"/>
-                <a:sym typeface="Helvetica Neue Medium"/>
-              </a:defRPr>
-            </a:pPr>
-            <a:r>
-              <a:t>environment</a:t>
-            </a:r>
-          </a:p>
-        </p:txBody>
-      </p:sp>
-      <p:sp>
-        <p:nvSpPr>
-          <p:cNvPr id="154" name="Line"/>
-          <p:cNvSpPr/>
-          <p:nvPr/>
-        </p:nvSpPr>
-        <p:spPr>
-          <a:xfrm>
-            <a:off x="6545294" y="6619735"/>
-            <a:ext cx="882534" cy="1"/>
+            <a:off x="6545294" y="6619734"/>
+            <a:ext cx="882535" cy="2"/>
           </a:xfrm>
           <a:prstGeom prst="line">
             <a:avLst/>
@@ -4012,7 +4296,7 @@
           </a:ln>
         </p:spPr>
         <p:txBody>
-          <a:bodyPr lIns="50800" tIns="50800" rIns="50800" bIns="50800" anchor="ctr"/>
+          <a:bodyPr lIns="45718" tIns="45718" rIns="45718" bIns="45718"/>
           <a:lstStyle/>
           <a:p>
             <a:pPr/>
@@ -4021,14 +4305,14 @@
       </p:sp>
       <p:sp>
         <p:nvSpPr>
-          <p:cNvPr id="155" name="Line"/>
+          <p:cNvPr id="161" name="Line"/>
           <p:cNvSpPr/>
           <p:nvPr/>
         </p:nvSpPr>
         <p:spPr>
           <a:xfrm>
-            <a:off x="13418008" y="3886831"/>
-            <a:ext cx="1243846" cy="1"/>
+            <a:off x="13418007" y="3886830"/>
+            <a:ext cx="1243847" cy="2"/>
           </a:xfrm>
           <a:prstGeom prst="line">
             <a:avLst/>
@@ -4042,7 +4326,7 @@
           </a:ln>
         </p:spPr>
         <p:txBody>
-          <a:bodyPr lIns="50800" tIns="50800" rIns="50800" bIns="50800" anchor="ctr"/>
+          <a:bodyPr lIns="45718" tIns="45718" rIns="45718" bIns="45718"/>
           <a:lstStyle/>
           <a:p>
             <a:pPr/>
@@ -4051,14 +4335,14 @@
       </p:sp>
       <p:sp>
         <p:nvSpPr>
-          <p:cNvPr id="156" name="Line"/>
+          <p:cNvPr id="162" name="Line"/>
           <p:cNvSpPr/>
           <p:nvPr/>
         </p:nvSpPr>
         <p:spPr>
           <a:xfrm flipH="1">
             <a:off x="8898214" y="4034609"/>
-            <a:ext cx="2334953" cy="1602994"/>
+            <a:ext cx="2334954" cy="1602995"/>
           </a:xfrm>
           <a:prstGeom prst="line">
             <a:avLst/>
@@ -4072,7 +4356,7 @@
           </a:ln>
         </p:spPr>
         <p:txBody>
-          <a:bodyPr lIns="50800" tIns="50800" rIns="50800" bIns="50800" anchor="ctr"/>
+          <a:bodyPr lIns="45718" tIns="45718" rIns="45718" bIns="45718"/>
           <a:lstStyle/>
           <a:p>
             <a:pPr/>
@@ -4081,14 +4365,14 @@
       </p:sp>
       <p:sp>
         <p:nvSpPr>
-          <p:cNvPr id="157" name="tf-serving"/>
-          <p:cNvSpPr/>
+          <p:cNvPr id="163" name="tf-serving"/>
+          <p:cNvSpPr txBox="1"/>
           <p:nvPr/>
         </p:nvSpPr>
         <p:spPr>
           <a:xfrm>
-            <a:off x="7580885" y="6922167"/>
-            <a:ext cx="1930538" cy="1600733"/>
+            <a:off x="7580885" y="7492003"/>
+            <a:ext cx="1930539" cy="461060"/>
           </a:xfrm>
           <a:prstGeom prst="rect">
             <a:avLst/>
@@ -4103,14 +4387,14 @@
           </a:extLst>
         </p:spPr>
         <p:txBody>
-          <a:bodyPr lIns="50800" tIns="50800" rIns="50800" bIns="50800" anchor="ctr"/>
+          <a:bodyPr lIns="50800" tIns="50800" rIns="50800" bIns="50800" anchor="ctr">
+            <a:spAutoFit/>
+          </a:bodyPr>
           <a:lstStyle>
             <a:lvl1pPr defTabSz="825500">
               <a:defRPr>
                 <a:solidFill>
-                  <a:schemeClr val="accent1">
-                    <a:lumOff val="-13575"/>
-                  </a:schemeClr>
+                  <a:srgbClr val="0076BA"/>
                 </a:solidFill>
                 <a:latin typeface="Helvetica Neue Medium"/>
                 <a:ea typeface="Helvetica Neue Medium"/>
@@ -4129,14 +4413,14 @@
       </p:sp>
       <p:sp>
         <p:nvSpPr>
-          <p:cNvPr id="158" name="fastAPI"/>
-          <p:cNvSpPr/>
+          <p:cNvPr id="164" name="fastAPI"/>
+          <p:cNvSpPr txBox="1"/>
           <p:nvPr/>
         </p:nvSpPr>
         <p:spPr>
           <a:xfrm>
-            <a:off x="11351598" y="4144659"/>
-            <a:ext cx="1930537" cy="1600733"/>
+            <a:off x="11351597" y="5095496"/>
+            <a:ext cx="1930538" cy="461059"/>
           </a:xfrm>
           <a:prstGeom prst="rect">
             <a:avLst/>
@@ -4151,14 +4435,14 @@
           </a:extLst>
         </p:spPr>
         <p:txBody>
-          <a:bodyPr lIns="50800" tIns="50800" rIns="50800" bIns="50800" anchor="ctr"/>
+          <a:bodyPr lIns="50800" tIns="50800" rIns="50800" bIns="50800" anchor="ctr">
+            <a:spAutoFit/>
+          </a:bodyPr>
           <a:lstStyle>
             <a:lvl1pPr defTabSz="825500">
               <a:defRPr>
                 <a:solidFill>
-                  <a:schemeClr val="accent1">
-                    <a:lumOff val="-13575"/>
-                  </a:schemeClr>
+                  <a:srgbClr val="0076BA"/>
                 </a:solidFill>
                 <a:latin typeface="Helvetica Neue Medium"/>
                 <a:ea typeface="Helvetica Neue Medium"/>
@@ -4175,68 +4459,128 @@
           </a:p>
         </p:txBody>
       </p:sp>
+      <p:grpSp>
+        <p:nvGrpSpPr>
+          <p:cNvPr id="167" name="web browser"/>
+          <p:cNvGrpSpPr/>
+          <p:nvPr/>
+        </p:nvGrpSpPr>
+        <p:grpSpPr>
+          <a:xfrm>
+            <a:off x="14797726" y="3136417"/>
+            <a:ext cx="1930538" cy="1600734"/>
+            <a:chOff x="0" y="0"/>
+            <a:chExt cx="1930537" cy="1600733"/>
+          </a:xfrm>
+        </p:grpSpPr>
+        <p:sp>
+          <p:nvSpPr>
+            <p:cNvPr id="165" name="Rectangle"/>
+            <p:cNvSpPr/>
+            <p:nvPr/>
+          </p:nvSpPr>
+          <p:spPr>
+            <a:xfrm>
+              <a:off x="-1" y="-1"/>
+              <a:ext cx="1930539" cy="1600735"/>
+            </a:xfrm>
+            <a:prstGeom prst="rect">
+              <a:avLst/>
+            </a:prstGeom>
+            <a:solidFill>
+              <a:srgbClr val="FFFFFF"/>
+            </a:solidFill>
+            <a:ln w="12700" cap="flat">
+              <a:solidFill>
+                <a:srgbClr val="000000"/>
+              </a:solidFill>
+              <a:prstDash val="solid"/>
+              <a:miter lim="400000"/>
+            </a:ln>
+            <a:effectLst/>
+          </p:spPr>
+          <p:txBody>
+            <a:bodyPr wrap="square" lIns="50800" tIns="50800" rIns="50800" bIns="50800" numCol="1" anchor="ctr">
+              <a:noAutofit/>
+            </a:bodyPr>
+            <a:lstStyle/>
+            <a:p>
+              <a:pPr defTabSz="825500">
+                <a:defRPr sz="3200">
+                  <a:solidFill>
+                    <a:srgbClr val="000000"/>
+                  </a:solidFill>
+                  <a:latin typeface="Helvetica Neue Medium"/>
+                  <a:ea typeface="Helvetica Neue Medium"/>
+                  <a:cs typeface="Helvetica Neue Medium"/>
+                  <a:sym typeface="Helvetica Neue Medium"/>
+                </a:defRPr>
+              </a:pPr>
+            </a:p>
+          </p:txBody>
+        </p:sp>
+        <p:sp>
+          <p:nvSpPr>
+            <p:cNvPr id="166" name="web browser"/>
+            <p:cNvSpPr txBox="1"/>
+            <p:nvPr/>
+          </p:nvSpPr>
+          <p:spPr>
+            <a:xfrm>
+              <a:off x="6349" y="260160"/>
+              <a:ext cx="1917839" cy="1080413"/>
+            </a:xfrm>
+            <a:prstGeom prst="rect">
+              <a:avLst/>
+            </a:prstGeom>
+            <a:noFill/>
+            <a:ln w="12700" cap="flat">
+              <a:noFill/>
+              <a:miter lim="400000"/>
+            </a:ln>
+            <a:effectLst/>
+            <a:extLst>
+              <a:ext uri="{C572A759-6A51-4108-AA02-DFA0A04FC94B}">
+                <ma14:wrappingTextBoxFlag xmlns:ma14="http://schemas.microsoft.com/office/mac/drawingml/2011/main" val="1"/>
+              </a:ext>
+            </a:extLst>
+          </p:spPr>
+          <p:txBody>
+            <a:bodyPr wrap="square" lIns="50800" tIns="50800" rIns="50800" bIns="50800" numCol="1" anchor="ctr">
+              <a:spAutoFit/>
+            </a:bodyPr>
+            <a:lstStyle>
+              <a:lvl1pPr defTabSz="825500">
+                <a:defRPr sz="3200">
+                  <a:solidFill>
+                    <a:srgbClr val="000000"/>
+                  </a:solidFill>
+                  <a:latin typeface="Helvetica Neue Medium"/>
+                  <a:ea typeface="Helvetica Neue Medium"/>
+                  <a:cs typeface="Helvetica Neue Medium"/>
+                  <a:sym typeface="Helvetica Neue Medium"/>
+                </a:defRPr>
+              </a:lvl1pPr>
+            </a:lstStyle>
+            <a:p>
+              <a:pPr/>
+              <a:r>
+                <a:t>web browser</a:t>
+              </a:r>
+            </a:p>
+          </p:txBody>
+        </p:sp>
+      </p:grpSp>
       <p:sp>
         <p:nvSpPr>
-          <p:cNvPr id="159" name="web browser"/>
-          <p:cNvSpPr/>
+          <p:cNvPr id="168" name="Safari, Chrome .."/>
+          <p:cNvSpPr txBox="1"/>
           <p:nvPr/>
         </p:nvSpPr>
         <p:spPr>
           <a:xfrm>
-            <a:off x="14797726" y="3136417"/>
-            <a:ext cx="1930537" cy="1600733"/>
-          </a:xfrm>
-          <a:prstGeom prst="rect">
-            <a:avLst/>
-          </a:prstGeom>
-          <a:solidFill>
-            <a:srgbClr val="FFFFFF"/>
-          </a:solidFill>
-          <a:ln w="12700">
-            <a:solidFill>
-              <a:srgbClr val="000000"/>
-            </a:solidFill>
-            <a:miter lim="400000"/>
-          </a:ln>
-          <a:extLst>
-            <a:ext uri="{C572A759-6A51-4108-AA02-DFA0A04FC94B}">
-              <ma14:wrappingTextBoxFlag xmlns:ma14="http://schemas.microsoft.com/office/mac/drawingml/2011/main" val="1"/>
-            </a:ext>
-          </a:extLst>
-        </p:spPr>
-        <p:txBody>
-          <a:bodyPr lIns="50800" tIns="50800" rIns="50800" bIns="50800" anchor="ctr"/>
-          <a:lstStyle>
-            <a:lvl1pPr defTabSz="825500">
-              <a:defRPr sz="3200">
-                <a:solidFill>
-                  <a:srgbClr val="000000"/>
-                </a:solidFill>
-                <a:latin typeface="Helvetica Neue Medium"/>
-                <a:ea typeface="Helvetica Neue Medium"/>
-                <a:cs typeface="Helvetica Neue Medium"/>
-                <a:sym typeface="Helvetica Neue Medium"/>
-              </a:defRPr>
-            </a:lvl1pPr>
-          </a:lstStyle>
-          <a:p>
-            <a:pPr/>
-            <a:r>
-              <a:t>web browser</a:t>
-            </a:r>
-          </a:p>
-        </p:txBody>
-      </p:sp>
-      <p:sp>
-        <p:nvSpPr>
-          <p:cNvPr id="160" name="Safari, Chrome .."/>
-          <p:cNvSpPr/>
-          <p:nvPr/>
-        </p:nvSpPr>
-        <p:spPr>
-          <a:xfrm>
-            <a:off x="14797726" y="4405831"/>
-            <a:ext cx="1930537" cy="1600733"/>
+            <a:off x="14797726" y="4791518"/>
+            <a:ext cx="1930538" cy="829359"/>
           </a:xfrm>
           <a:prstGeom prst="rect">
             <a:avLst/>
@@ -4251,14 +4595,14 @@
           </a:extLst>
         </p:spPr>
         <p:txBody>
-          <a:bodyPr lIns="50800" tIns="50800" rIns="50800" bIns="50800" anchor="ctr"/>
+          <a:bodyPr lIns="50800" tIns="50800" rIns="50800" bIns="50800" anchor="ctr">
+            <a:spAutoFit/>
+          </a:bodyPr>
           <a:lstStyle>
             <a:lvl1pPr defTabSz="825500">
               <a:defRPr>
                 <a:solidFill>
-                  <a:schemeClr val="accent1">
-                    <a:lumOff val="-13575"/>
-                  </a:schemeClr>
+                  <a:srgbClr val="0076BA"/>
                 </a:solidFill>
                 <a:latin typeface="Helvetica Neue Medium"/>
                 <a:ea typeface="Helvetica Neue Medium"/>
@@ -4277,14 +4621,14 @@
       </p:sp>
       <p:sp>
         <p:nvSpPr>
-          <p:cNvPr id="161" name="Line"/>
+          <p:cNvPr id="169" name="Line"/>
           <p:cNvSpPr/>
           <p:nvPr/>
         </p:nvSpPr>
         <p:spPr>
           <a:xfrm flipH="1">
-            <a:off x="13392608" y="4143588"/>
-            <a:ext cx="1243846" cy="1"/>
+            <a:off x="13392607" y="4143588"/>
+            <a:ext cx="1243847" cy="2"/>
           </a:xfrm>
           <a:prstGeom prst="line">
             <a:avLst/>
@@ -4298,7 +4642,7 @@
           </a:ln>
         </p:spPr>
         <p:txBody>
-          <a:bodyPr lIns="50800" tIns="50800" rIns="50800" bIns="50800" anchor="ctr"/>
+          <a:bodyPr lIns="45718" tIns="45718" rIns="45718" bIns="45718"/>
           <a:lstStyle/>
           <a:p>
             <a:pPr/>
@@ -4307,14 +4651,14 @@
       </p:sp>
       <p:sp>
         <p:nvSpPr>
-          <p:cNvPr id="162" name="Line"/>
+          <p:cNvPr id="170" name="Line"/>
           <p:cNvSpPr/>
           <p:nvPr/>
         </p:nvSpPr>
         <p:spPr>
           <a:xfrm flipV="1">
-            <a:off x="9646654" y="5103787"/>
-            <a:ext cx="1922463" cy="1208191"/>
+            <a:off x="9646653" y="5103786"/>
+            <a:ext cx="1922464" cy="1208192"/>
           </a:xfrm>
           <a:prstGeom prst="line">
             <a:avLst/>
@@ -4328,7 +4672,7 @@
           </a:ln>
         </p:spPr>
         <p:txBody>
-          <a:bodyPr lIns="50800" tIns="50800" rIns="50800" bIns="50800" anchor="ctr"/>
+          <a:bodyPr lIns="45718" tIns="45718" rIns="45718" bIns="45718"/>
           <a:lstStyle/>
           <a:p>
             <a:pPr/>
@@ -4337,14 +4681,14 @@
       </p:sp>
       <p:sp>
         <p:nvSpPr>
-          <p:cNvPr id="163" name="rGPC…"/>
-          <p:cNvSpPr/>
+          <p:cNvPr id="171" name="rGPC…"/>
+          <p:cNvSpPr txBox="1"/>
           <p:nvPr/>
         </p:nvSpPr>
         <p:spPr>
           <a:xfrm>
-            <a:off x="9453864" y="4405831"/>
-            <a:ext cx="1930537" cy="1600733"/>
+            <a:off x="9414562" y="4961409"/>
+            <a:ext cx="1930538" cy="729233"/>
           </a:xfrm>
           <a:prstGeom prst="rect">
             <a:avLst/>
@@ -4359,7 +4703,9 @@
           </a:extLst>
         </p:spPr>
         <p:txBody>
-          <a:bodyPr lIns="50800" tIns="50800" rIns="50800" bIns="50800" anchor="ctr"/>
+          <a:bodyPr lIns="50800" tIns="50800" rIns="50800" bIns="50800" anchor="ctr">
+            <a:spAutoFit/>
+          </a:bodyPr>
           <a:lstStyle/>
           <a:p>
             <a:pPr defTabSz="825500">
@@ -4397,14 +4743,14 @@
       </p:sp>
       <p:sp>
         <p:nvSpPr>
-          <p:cNvPr id="164" name="Rectangle"/>
+          <p:cNvPr id="172" name="Rectangle"/>
           <p:cNvSpPr/>
           <p:nvPr/>
         </p:nvSpPr>
         <p:spPr>
           <a:xfrm>
-            <a:off x="2942794" y="4487632"/>
-            <a:ext cx="3462143" cy="4264208"/>
+            <a:off x="2942794" y="4487631"/>
+            <a:ext cx="3462143" cy="4264209"/>
           </a:xfrm>
           <a:prstGeom prst="rect">
             <a:avLst/>
@@ -4436,14 +4782,14 @@
       </p:sp>
       <p:sp>
         <p:nvSpPr>
-          <p:cNvPr id="165" name="Google Colab"/>
-          <p:cNvSpPr/>
+          <p:cNvPr id="173" name="Google Colab"/>
+          <p:cNvSpPr txBox="1"/>
           <p:nvPr/>
         </p:nvSpPr>
         <p:spPr>
           <a:xfrm>
-            <a:off x="3542396" y="8763494"/>
-            <a:ext cx="1930537" cy="1138395"/>
+            <a:off x="3542396" y="8879911"/>
+            <a:ext cx="1930538" cy="829360"/>
           </a:xfrm>
           <a:prstGeom prst="rect">
             <a:avLst/>
@@ -4458,14 +4804,14 @@
           </a:extLst>
         </p:spPr>
         <p:txBody>
-          <a:bodyPr lIns="50800" tIns="50800" rIns="50800" bIns="50800" anchor="ctr"/>
+          <a:bodyPr lIns="50800" tIns="50800" rIns="50800" bIns="50800" anchor="ctr">
+            <a:spAutoFit/>
+          </a:bodyPr>
           <a:lstStyle>
             <a:lvl1pPr defTabSz="825500">
               <a:defRPr>
                 <a:solidFill>
-                  <a:schemeClr val="accent1">
-                    <a:lumOff val="-13575"/>
-                  </a:schemeClr>
+                  <a:srgbClr val="0076BA"/>
                 </a:solidFill>
                 <a:latin typeface="Helvetica Neue Medium"/>
                 <a:ea typeface="Helvetica Neue Medium"/>
@@ -4484,14 +4830,14 @@
       </p:sp>
       <p:sp>
         <p:nvSpPr>
-          <p:cNvPr id="166" name="Rectangle"/>
+          <p:cNvPr id="174" name="Rectangle"/>
           <p:cNvSpPr/>
           <p:nvPr/>
         </p:nvSpPr>
         <p:spPr>
           <a:xfrm>
-            <a:off x="7245785" y="2808025"/>
-            <a:ext cx="10142164" cy="5810467"/>
+            <a:off x="7245784" y="2808024"/>
+            <a:ext cx="10142165" cy="5810468"/>
           </a:xfrm>
           <a:prstGeom prst="rect">
             <a:avLst/>
@@ -4523,14 +4869,14 @@
       </p:sp>
       <p:sp>
         <p:nvSpPr>
-          <p:cNvPr id="167" name="Deployment &amp; serving"/>
-          <p:cNvSpPr/>
+          <p:cNvPr id="175" name="Deployment &amp; serving"/>
+          <p:cNvSpPr txBox="1"/>
           <p:nvPr/>
         </p:nvSpPr>
         <p:spPr>
           <a:xfrm>
-            <a:off x="10181173" y="1788701"/>
-            <a:ext cx="4347588" cy="1138395"/>
+            <a:off x="10295472" y="1569356"/>
+            <a:ext cx="4347589" cy="907033"/>
           </a:xfrm>
           <a:prstGeom prst="rect">
             <a:avLst/>
@@ -4545,9 +4891,12 @@
           </a:extLst>
         </p:spPr>
         <p:txBody>
-          <a:bodyPr lIns="50800" tIns="50800" rIns="50800" bIns="50800" anchor="ctr"/>
-          <a:lstStyle>
-            <a:lvl1pPr defTabSz="825500">
+          <a:bodyPr lIns="50800" tIns="50800" rIns="50800" bIns="50800" anchor="ctr">
+            <a:spAutoFit/>
+          </a:bodyPr>
+          <a:lstStyle/>
+          <a:p>
+            <a:pPr defTabSz="825500">
               <a:defRPr sz="3200">
                 <a:solidFill>
                   <a:srgbClr val="000000"/>
@@ -4557,26 +4906,27 @@
                 <a:cs typeface="Helvetica Neue Medium"/>
                 <a:sym typeface="Helvetica Neue Medium"/>
               </a:defRPr>
-            </a:lvl1pPr>
-          </a:lstStyle>
-          <a:p>
-            <a:pPr/>
-            <a:r>
-              <a:t>Deployment &amp; serving</a:t>
+            </a:pPr>
+            <a:r>
+              <a:t>Deployment server </a:t>
+            </a:r>
+            <a:r>
+              <a:rPr sz="2000"/>
+              <a:t>(Docker installed, &gt; 4GB RAM)</a:t>
             </a:r>
           </a:p>
         </p:txBody>
       </p:sp>
       <p:sp>
         <p:nvSpPr>
-          <p:cNvPr id="168" name="Server machine(s)"/>
-          <p:cNvSpPr/>
+          <p:cNvPr id="176" name="Server machine(s)"/>
+          <p:cNvSpPr txBox="1"/>
           <p:nvPr/>
         </p:nvSpPr>
         <p:spPr>
           <a:xfrm>
-            <a:off x="10512947" y="8663341"/>
-            <a:ext cx="3912640" cy="656951"/>
+            <a:off x="10512946" y="8761287"/>
+            <a:ext cx="3912640" cy="461059"/>
           </a:xfrm>
           <a:prstGeom prst="rect">
             <a:avLst/>
@@ -4591,13 +4941,64 @@
           </a:extLst>
         </p:spPr>
         <p:txBody>
-          <a:bodyPr lIns="50800" tIns="50800" rIns="50800" bIns="50800" anchor="ctr"/>
+          <a:bodyPr lIns="50800" tIns="50800" rIns="50800" bIns="50800" anchor="ctr">
+            <a:spAutoFit/>
+          </a:bodyPr>
           <a:lstStyle>
             <a:lvl1pPr defTabSz="825500">
               <a:defRPr>
                 <a:solidFill>
-                  <a:schemeClr val="accent1">
-                    <a:lumOff val="-13575"/>
+                  <a:srgbClr val="0076BA"/>
+                </a:solidFill>
+                <a:latin typeface="Helvetica Neue Medium"/>
+                <a:ea typeface="Helvetica Neue Medium"/>
+                <a:cs typeface="Helvetica Neue Medium"/>
+                <a:sym typeface="Helvetica Neue Medium"/>
+              </a:defRPr>
+            </a:lvl1pPr>
+          </a:lstStyle>
+          <a:p>
+            <a:pPr/>
+            <a:r>
+              <a:t>Server machine(s)</a:t>
+            </a:r>
+          </a:p>
+        </p:txBody>
+      </p:sp>
+      <p:sp>
+        <p:nvSpPr>
+          <p:cNvPr id="177" name="tf-serving"/>
+          <p:cNvSpPr txBox="1"/>
+          <p:nvPr/>
+        </p:nvSpPr>
+        <p:spPr>
+          <a:xfrm>
+            <a:off x="7568185" y="4975259"/>
+            <a:ext cx="1930539" cy="829360"/>
+          </a:xfrm>
+          <a:prstGeom prst="rect">
+            <a:avLst/>
+          </a:prstGeom>
+          <a:ln w="12700">
+            <a:miter lim="400000"/>
+          </a:ln>
+          <a:extLst>
+            <a:ext uri="{C572A759-6A51-4108-AA02-DFA0A04FC94B}">
+              <ma14:wrappingTextBoxFlag xmlns:ma14="http://schemas.microsoft.com/office/mac/drawingml/2011/main" val="1"/>
+            </a:ext>
+          </a:extLst>
+        </p:spPr>
+        <p:txBody>
+          <a:bodyPr lIns="50800" tIns="50800" rIns="50800" bIns="50800" anchor="ctr">
+            <a:spAutoFit/>
+          </a:bodyPr>
+          <a:lstStyle>
+            <a:lvl1pPr defTabSz="825500">
+              <a:defRPr>
+                <a:solidFill>
+                  <a:schemeClr val="accent5">
+                    <a:satOff val="-41871"/>
+                    <a:lumOff val="-13058"/>
                   </a:schemeClr>
                 </a:solidFill>
                 <a:latin typeface="Helvetica Neue Medium"/>
@@ -4610,7 +5011,109 @@
           <a:p>
             <a:pPr/>
             <a:r>
-              <a:t>Server machine(s)</a:t>
+              <a:t>docker container</a:t>
+            </a:r>
+          </a:p>
+        </p:txBody>
+      </p:sp>
+      <p:sp>
+        <p:nvSpPr>
+          <p:cNvPr id="178" name="tf-serving"/>
+          <p:cNvSpPr txBox="1"/>
+          <p:nvPr/>
+        </p:nvSpPr>
+        <p:spPr>
+          <a:xfrm>
+            <a:off x="11351597" y="2760145"/>
+            <a:ext cx="1930539" cy="829360"/>
+          </a:xfrm>
+          <a:prstGeom prst="rect">
+            <a:avLst/>
+          </a:prstGeom>
+          <a:ln w="12700">
+            <a:miter lim="400000"/>
+          </a:ln>
+          <a:extLst>
+            <a:ext uri="{C572A759-6A51-4108-AA02-DFA0A04FC94B}">
+              <ma14:wrappingTextBoxFlag xmlns:ma14="http://schemas.microsoft.com/office/mac/drawingml/2011/main" val="1"/>
+            </a:ext>
+          </a:extLst>
+        </p:spPr>
+        <p:txBody>
+          <a:bodyPr lIns="50800" tIns="50800" rIns="50800" bIns="50800" anchor="ctr">
+            <a:spAutoFit/>
+          </a:bodyPr>
+          <a:lstStyle>
+            <a:lvl1pPr defTabSz="825500">
+              <a:defRPr>
+                <a:solidFill>
+                  <a:schemeClr val="accent5">
+                    <a:satOff val="-41871"/>
+                    <a:lumOff val="-13058"/>
+                  </a:schemeClr>
+                </a:solidFill>
+                <a:latin typeface="Helvetica Neue Medium"/>
+                <a:ea typeface="Helvetica Neue Medium"/>
+                <a:cs typeface="Helvetica Neue Medium"/>
+                <a:sym typeface="Helvetica Neue Medium"/>
+              </a:defRPr>
+            </a:lvl1pPr>
+          </a:lstStyle>
+          <a:p>
+            <a:pPr/>
+            <a:r>
+              <a:t>docker container</a:t>
+            </a:r>
+          </a:p>
+        </p:txBody>
+      </p:sp>
+      <p:sp>
+        <p:nvSpPr>
+          <p:cNvPr id="179" name="Google Colab"/>
+          <p:cNvSpPr txBox="1"/>
+          <p:nvPr/>
+        </p:nvSpPr>
+        <p:spPr>
+          <a:xfrm>
+            <a:off x="3708596" y="3530201"/>
+            <a:ext cx="1930538" cy="829360"/>
+          </a:xfrm>
+          <a:prstGeom prst="rect">
+            <a:avLst/>
+          </a:prstGeom>
+          <a:ln w="12700">
+            <a:miter lim="400000"/>
+          </a:ln>
+          <a:extLst>
+            <a:ext uri="{C572A759-6A51-4108-AA02-DFA0A04FC94B}">
+              <ma14:wrappingTextBoxFlag xmlns:ma14="http://schemas.microsoft.com/office/mac/drawingml/2011/main" val="1"/>
+            </a:ext>
+          </a:extLst>
+        </p:spPr>
+        <p:txBody>
+          <a:bodyPr lIns="50800" tIns="50800" rIns="50800" bIns="50800" anchor="ctr">
+            <a:spAutoFit/>
+          </a:bodyPr>
+          <a:lstStyle>
+            <a:lvl1pPr defTabSz="825500">
+              <a:defRPr>
+                <a:solidFill>
+                  <a:schemeClr val="accent5">
+                    <a:satOff val="-41871"/>
+                    <a:lumOff val="-13058"/>
+                  </a:schemeClr>
+                </a:solidFill>
+                <a:latin typeface="Helvetica Neue Medium"/>
+                <a:ea typeface="Helvetica Neue Medium"/>
+                <a:cs typeface="Helvetica Neue Medium"/>
+                <a:sym typeface="Helvetica Neue Medium"/>
+              </a:defRPr>
+            </a:lvl1pPr>
+          </a:lstStyle>
+          <a:p>
+            <a:pPr/>
+            <a:r>
+              <a:t>Google linux machine</a:t>
             </a:r>
           </a:p>
         </p:txBody>
@@ -4635,10 +5138,10 @@
         <a:srgbClr val="FFFFFF"/>
       </a:lt1>
       <a:dk2>
-        <a:srgbClr val="5E5E5E"/>
+        <a:srgbClr val="A7A7A7"/>
       </a:dk2>
       <a:lt2>
-        <a:srgbClr val="D5D5D5"/>
+        <a:srgbClr val="535353"/>
       </a:lt2>
       <a:accent1>
         <a:srgbClr val="00A2FF"/>
@@ -4672,9 +5175,9 @@
         <a:cs typeface="Helvetica Neue"/>
       </a:majorFont>
       <a:minorFont>
-        <a:latin typeface="Helvetica Neue"/>
-        <a:ea typeface="Helvetica Neue"/>
-        <a:cs typeface="Helvetica Neue"/>
+        <a:latin typeface="Helvetica"/>
+        <a:ea typeface="Helvetica"/>
+        <a:cs typeface="Helvetica"/>
       </a:minorFont>
     </a:fontScheme>
     <a:fmtScheme name="21_BasicWhite">
@@ -4815,11 +5318,14 @@
     <a:spDef>
       <a:spPr>
         <a:solidFill>
-          <a:srgbClr val="000000"/>
+          <a:srgbClr val="FFFFFF"/>
         </a:solidFill>
-        <a:ln w="12700" cap="flat">
-          <a:noFill/>
-          <a:miter lim="400000"/>
+        <a:ln w="25400" cap="flat">
+          <a:solidFill>
+            <a:schemeClr val="accent1"/>
+          </a:solidFill>
+          <a:prstDash val="solid"/>
+          <a:round/>
         </a:ln>
         <a:effectLst/>
         <a:sp3d/>
@@ -4828,7 +5334,7 @@
         <a:spAutoFit/>
       </a:bodyPr>
       <a:lstStyle>
-        <a:defPPr marL="0" marR="0" indent="0" algn="ctr" defTabSz="825500" rtl="0" fontAlgn="auto" latinLnBrk="0" hangingPunct="0">
+        <a:defPPr marL="0" marR="0" indent="0" algn="ctr" defTabSz="2438337" rtl="0" fontAlgn="auto" latinLnBrk="0" hangingPunct="0">
           <a:lnSpc>
             <a:spcPct val="100000"/>
           </a:lnSpc>
@@ -4843,19 +5349,19 @@
           <a:buFontTx/>
           <a:buNone/>
           <a:tabLst/>
-          <a:defRPr b="0" baseline="0" cap="none" i="0" spc="0" strike="noStrike" sz="3200" u="none" kumimoji="0" normalizeH="0">
+          <a:defRPr b="0" baseline="0" cap="none" i="0" spc="0" strike="noStrike" sz="2400" u="none" kumimoji="0" normalizeH="0">
             <a:ln>
               <a:noFill/>
             </a:ln>
             <a:solidFill>
-              <a:srgbClr val="FFFFFF"/>
+              <a:srgbClr val="5E5E5E"/>
             </a:solidFill>
             <a:effectLst/>
             <a:uFillTx/>
-            <a:latin typeface="Helvetica Neue Medium"/>
-            <a:ea typeface="Helvetica Neue Medium"/>
-            <a:cs typeface="Helvetica Neue Medium"/>
-            <a:sym typeface="Helvetica Neue Medium"/>
+            <a:latin typeface="+mj-lt"/>
+            <a:ea typeface="+mj-ea"/>
+            <a:cs typeface="+mj-cs"/>
+            <a:sym typeface="Helvetica Neue"/>
           </a:defRPr>
         </a:defPPr>
         <a:lvl1pPr marL="0" marR="0" indent="0" algn="l" defTabSz="914400" rtl="0" fontAlgn="auto" latinLnBrk="1" hangingPunct="0">
@@ -5105,10 +5611,10 @@
         <a:noFill/>
         <a:ln w="25400" cap="flat">
           <a:solidFill>
-            <a:srgbClr val="000000"/>
+            <a:schemeClr val="accent1"/>
           </a:solidFill>
           <a:prstDash val="solid"/>
-          <a:miter lim="400000"/>
+          <a:round/>
         </a:ln>
         <a:effectLst/>
         <a:sp3d/>
@@ -5399,7 +5905,7 @@
         <a:spAutoFit/>
       </a:bodyPr>
       <a:lstStyle>
-        <a:defPPr marL="0" marR="0" indent="0" algn="ctr" defTabSz="2438338" rtl="0" fontAlgn="auto" latinLnBrk="0" hangingPunct="0">
+        <a:defPPr marL="0" marR="0" indent="0" algn="ctr" defTabSz="2438337" rtl="0" fontAlgn="auto" latinLnBrk="0" hangingPunct="0">
           <a:lnSpc>
             <a:spcPct val="100000"/>
           </a:lnSpc>
@@ -5423,9 +5929,9 @@
             </a:solidFill>
             <a:effectLst/>
             <a:uFillTx/>
-            <a:latin typeface="+mn-lt"/>
-            <a:ea typeface="+mn-ea"/>
-            <a:cs typeface="+mn-cs"/>
+            <a:latin typeface="+mj-lt"/>
+            <a:ea typeface="+mj-ea"/>
+            <a:cs typeface="+mj-cs"/>
             <a:sym typeface="Helvetica Neue"/>
           </a:defRPr>
         </a:defPPr>
@@ -5686,10 +6192,10 @@
         <a:srgbClr val="FFFFFF"/>
       </a:lt1>
       <a:dk2>
-        <a:srgbClr val="5E5E5E"/>
+        <a:srgbClr val="A7A7A7"/>
       </a:dk2>
       <a:lt2>
-        <a:srgbClr val="D5D5D5"/>
+        <a:srgbClr val="535353"/>
       </a:lt2>
       <a:accent1>
         <a:srgbClr val="00A2FF"/>
@@ -5723,9 +6229,9 @@
         <a:cs typeface="Helvetica Neue"/>
       </a:majorFont>
       <a:minorFont>
-        <a:latin typeface="Helvetica Neue"/>
-        <a:ea typeface="Helvetica Neue"/>
-        <a:cs typeface="Helvetica Neue"/>
+        <a:latin typeface="Helvetica"/>
+        <a:ea typeface="Helvetica"/>
+        <a:cs typeface="Helvetica"/>
       </a:minorFont>
     </a:fontScheme>
     <a:fmtScheme name="21_BasicWhite">
@@ -5866,11 +6372,14 @@
     <a:spDef>
       <a:spPr>
         <a:solidFill>
-          <a:srgbClr val="000000"/>
+          <a:srgbClr val="FFFFFF"/>
         </a:solidFill>
-        <a:ln w="12700" cap="flat">
-          <a:noFill/>
-          <a:miter lim="400000"/>
+        <a:ln w="25400" cap="flat">
+          <a:solidFill>
+            <a:schemeClr val="accent1"/>
+          </a:solidFill>
+          <a:prstDash val="solid"/>
+          <a:round/>
         </a:ln>
         <a:effectLst/>
         <a:sp3d/>
@@ -5879,7 +6388,7 @@
         <a:spAutoFit/>
       </a:bodyPr>
       <a:lstStyle>
-        <a:defPPr marL="0" marR="0" indent="0" algn="ctr" defTabSz="825500" rtl="0" fontAlgn="auto" latinLnBrk="0" hangingPunct="0">
+        <a:defPPr marL="0" marR="0" indent="0" algn="ctr" defTabSz="2438337" rtl="0" fontAlgn="auto" latinLnBrk="0" hangingPunct="0">
           <a:lnSpc>
             <a:spcPct val="100000"/>
           </a:lnSpc>
@@ -5894,19 +6403,19 @@
           <a:buFontTx/>
           <a:buNone/>
           <a:tabLst/>
-          <a:defRPr b="0" baseline="0" cap="none" i="0" spc="0" strike="noStrike" sz="3200" u="none" kumimoji="0" normalizeH="0">
+          <a:defRPr b="0" baseline="0" cap="none" i="0" spc="0" strike="noStrike" sz="2400" u="none" kumimoji="0" normalizeH="0">
             <a:ln>
               <a:noFill/>
             </a:ln>
             <a:solidFill>
-              <a:srgbClr val="FFFFFF"/>
+              <a:srgbClr val="5E5E5E"/>
             </a:solidFill>
             <a:effectLst/>
             <a:uFillTx/>
-            <a:latin typeface="Helvetica Neue Medium"/>
-            <a:ea typeface="Helvetica Neue Medium"/>
-            <a:cs typeface="Helvetica Neue Medium"/>
-            <a:sym typeface="Helvetica Neue Medium"/>
+            <a:latin typeface="+mj-lt"/>
+            <a:ea typeface="+mj-ea"/>
+            <a:cs typeface="+mj-cs"/>
+            <a:sym typeface="Helvetica Neue"/>
           </a:defRPr>
         </a:defPPr>
         <a:lvl1pPr marL="0" marR="0" indent="0" algn="l" defTabSz="914400" rtl="0" fontAlgn="auto" latinLnBrk="1" hangingPunct="0">
@@ -6156,10 +6665,10 @@
         <a:noFill/>
         <a:ln w="25400" cap="flat">
           <a:solidFill>
-            <a:srgbClr val="000000"/>
+            <a:schemeClr val="accent1"/>
           </a:solidFill>
           <a:prstDash val="solid"/>
-          <a:miter lim="400000"/>
+          <a:round/>
         </a:ln>
         <a:effectLst/>
         <a:sp3d/>
@@ -6450,7 +6959,7 @@
         <a:spAutoFit/>
       </a:bodyPr>
       <a:lstStyle>
-        <a:defPPr marL="0" marR="0" indent="0" algn="ctr" defTabSz="2438338" rtl="0" fontAlgn="auto" latinLnBrk="0" hangingPunct="0">
+        <a:defPPr marL="0" marR="0" indent="0" algn="ctr" defTabSz="2438337" rtl="0" fontAlgn="auto" latinLnBrk="0" hangingPunct="0">
           <a:lnSpc>
             <a:spcPct val="100000"/>
           </a:lnSpc>
@@ -6474,9 +6983,9 @@
             </a:solidFill>
             <a:effectLst/>
             <a:uFillTx/>
-            <a:latin typeface="+mn-lt"/>
-            <a:ea typeface="+mn-ea"/>
-            <a:cs typeface="+mn-cs"/>
+            <a:latin typeface="+mj-lt"/>
+            <a:ea typeface="+mj-ea"/>
+            <a:cs typeface="+mj-cs"/>
             <a:sym typeface="Helvetica Neue"/>
           </a:defRPr>
         </a:defPPr>

</xml_diff>